<commit_message>
My slides now at front.
</commit_message>
<xml_diff>
--- a/Presentation/Echo_Presentation.pptx
+++ b/Presentation/Echo_Presentation.pptx
@@ -5,20 +5,24 @@
     <p:sldMasterId id="2147483648" r:id="rId1"/>
   </p:sldMasterIdLst>
   <p:notesMasterIdLst>
-    <p:notesMasterId r:id="rId13"/>
+    <p:notesMasterId r:id="rId17"/>
   </p:notesMasterIdLst>
   <p:sldIdLst>
     <p:sldId id="266" r:id="rId2"/>
-    <p:sldId id="256" r:id="rId3"/>
-    <p:sldId id="262" r:id="rId4"/>
-    <p:sldId id="267" r:id="rId5"/>
-    <p:sldId id="257" r:id="rId6"/>
-    <p:sldId id="264" r:id="rId7"/>
-    <p:sldId id="265" r:id="rId8"/>
-    <p:sldId id="258" r:id="rId9"/>
-    <p:sldId id="259" r:id="rId10"/>
-    <p:sldId id="260" r:id="rId11"/>
-    <p:sldId id="261" r:id="rId12"/>
+    <p:sldId id="265" r:id="rId3"/>
+    <p:sldId id="268" r:id="rId4"/>
+    <p:sldId id="269" r:id="rId5"/>
+    <p:sldId id="270" r:id="rId6"/>
+    <p:sldId id="271" r:id="rId7"/>
+    <p:sldId id="256" r:id="rId8"/>
+    <p:sldId id="262" r:id="rId9"/>
+    <p:sldId id="267" r:id="rId10"/>
+    <p:sldId id="257" r:id="rId11"/>
+    <p:sldId id="264" r:id="rId12"/>
+    <p:sldId id="258" r:id="rId13"/>
+    <p:sldId id="259" r:id="rId14"/>
+    <p:sldId id="260" r:id="rId15"/>
+    <p:sldId id="261" r:id="rId16"/>
   </p:sldIdLst>
   <p:sldSz cx="12192000" cy="6858000"/>
   <p:notesSz cx="6858000" cy="9144000"/>
@@ -119,7 +123,7 @@
   </p:defaultTextStyle>
   <p:extLst>
     <p:ext uri="{EFAFB233-063F-42B5-8137-9DF3F51BA10A}">
-      <p15:sldGuideLst xmlns:p15="http://schemas.microsoft.com/office/powerpoint/2012/main" xmlns=""/>
+      <p15:sldGuideLst xmlns="" xmlns:p15="http://schemas.microsoft.com/office/powerpoint/2012/main"/>
     </p:ext>
   </p:extLst>
 </p:presentation>
@@ -217,11 +221,11 @@
           <c:showBubbleSize val="0"/>
         </c:dLbls>
         <c:gapWidth val="150"/>
-        <c:axId val="2139173848"/>
-        <c:axId val="2119068792"/>
+        <c:axId val="-2092342072"/>
+        <c:axId val="-2087519208"/>
       </c:barChart>
       <c:catAx>
-        <c:axId val="2139173848"/>
+        <c:axId val="-2092342072"/>
         <c:scaling>
           <c:orientation val="minMax"/>
         </c:scaling>
@@ -231,7 +235,7 @@
         <c:majorTickMark val="out"/>
         <c:minorTickMark val="none"/>
         <c:tickLblPos val="nextTo"/>
-        <c:crossAx val="2119068792"/>
+        <c:crossAx val="-2087519208"/>
         <c:crosses val="autoZero"/>
         <c:auto val="1"/>
         <c:lblAlgn val="ctr"/>
@@ -239,7 +243,7 @@
         <c:noMultiLvlLbl val="0"/>
       </c:catAx>
       <c:valAx>
-        <c:axId val="2119068792"/>
+        <c:axId val="-2087519208"/>
         <c:scaling>
           <c:orientation val="minMax"/>
         </c:scaling>
@@ -250,7 +254,7 @@
         <c:majorTickMark val="out"/>
         <c:minorTickMark val="none"/>
         <c:tickLblPos val="nextTo"/>
-        <c:crossAx val="2139173848"/>
+        <c:crossAx val="-2092342072"/>
         <c:crosses val="autoZero"/>
         <c:crossBetween val="between"/>
       </c:valAx>
@@ -347,11 +351,11 @@
           <c:showBubbleSize val="0"/>
         </c:dLbls>
         <c:gapWidth val="150"/>
-        <c:axId val="2118945448"/>
-        <c:axId val="2118948392"/>
+        <c:axId val="-2088379864"/>
+        <c:axId val="-2088376920"/>
       </c:barChart>
       <c:catAx>
-        <c:axId val="2118945448"/>
+        <c:axId val="-2088379864"/>
         <c:scaling>
           <c:orientation val="minMax"/>
         </c:scaling>
@@ -361,7 +365,7 @@
         <c:majorTickMark val="out"/>
         <c:minorTickMark val="none"/>
         <c:tickLblPos val="nextTo"/>
-        <c:crossAx val="2118948392"/>
+        <c:crossAx val="-2088376920"/>
         <c:crosses val="autoZero"/>
         <c:auto val="1"/>
         <c:lblAlgn val="ctr"/>
@@ -369,7 +373,7 @@
         <c:noMultiLvlLbl val="0"/>
       </c:catAx>
       <c:valAx>
-        <c:axId val="2118948392"/>
+        <c:axId val="-2088376920"/>
         <c:scaling>
           <c:orientation val="minMax"/>
         </c:scaling>
@@ -380,7 +384,7 @@
         <c:majorTickMark val="out"/>
         <c:minorTickMark val="none"/>
         <c:tickLblPos val="nextTo"/>
-        <c:crossAx val="2118945448"/>
+        <c:crossAx val="-2088379864"/>
         <c:crosses val="autoZero"/>
         <c:crossBetween val="between"/>
       </c:valAx>
@@ -477,11 +481,11 @@
           <c:showBubbleSize val="0"/>
         </c:dLbls>
         <c:gapWidth val="150"/>
-        <c:axId val="2118839352"/>
-        <c:axId val="2117563240"/>
+        <c:axId val="-2086830760"/>
+        <c:axId val="-2085881448"/>
       </c:barChart>
       <c:catAx>
-        <c:axId val="2118839352"/>
+        <c:axId val="-2086830760"/>
         <c:scaling>
           <c:orientation val="minMax"/>
         </c:scaling>
@@ -491,7 +495,7 @@
         <c:majorTickMark val="out"/>
         <c:minorTickMark val="none"/>
         <c:tickLblPos val="nextTo"/>
-        <c:crossAx val="2117563240"/>
+        <c:crossAx val="-2085881448"/>
         <c:crosses val="autoZero"/>
         <c:auto val="1"/>
         <c:lblAlgn val="ctr"/>
@@ -499,7 +503,7 @@
         <c:noMultiLvlLbl val="0"/>
       </c:catAx>
       <c:valAx>
-        <c:axId val="2117563240"/>
+        <c:axId val="-2085881448"/>
         <c:scaling>
           <c:orientation val="minMax"/>
         </c:scaling>
@@ -510,7 +514,7 @@
         <c:majorTickMark val="out"/>
         <c:minorTickMark val="none"/>
         <c:tickLblPos val="nextTo"/>
-        <c:crossAx val="2118839352"/>
+        <c:crossAx val="-2086830760"/>
         <c:crosses val="autoZero"/>
         <c:crossBetween val="between"/>
         <c:majorUnit val="1.0"/>
@@ -608,11 +612,11 @@
           <c:showBubbleSize val="0"/>
         </c:dLbls>
         <c:gapWidth val="150"/>
-        <c:axId val="2118807416"/>
-        <c:axId val="2118590696"/>
+        <c:axId val="-2086062392"/>
+        <c:axId val="-2086059448"/>
       </c:barChart>
       <c:catAx>
-        <c:axId val="2118807416"/>
+        <c:axId val="-2086062392"/>
         <c:scaling>
           <c:orientation val="minMax"/>
         </c:scaling>
@@ -622,7 +626,7 @@
         <c:majorTickMark val="out"/>
         <c:minorTickMark val="none"/>
         <c:tickLblPos val="nextTo"/>
-        <c:crossAx val="2118590696"/>
+        <c:crossAx val="-2086059448"/>
         <c:crosses val="autoZero"/>
         <c:auto val="1"/>
         <c:lblAlgn val="ctr"/>
@@ -630,7 +634,7 @@
         <c:noMultiLvlLbl val="0"/>
       </c:catAx>
       <c:valAx>
-        <c:axId val="2118590696"/>
+        <c:axId val="-2086059448"/>
         <c:scaling>
           <c:orientation val="minMax"/>
         </c:scaling>
@@ -641,7 +645,7 @@
         <c:majorTickMark val="out"/>
         <c:minorTickMark val="none"/>
         <c:tickLblPos val="nextTo"/>
-        <c:crossAx val="2118807416"/>
+        <c:crossAx val="-2086062392"/>
         <c:crosses val="autoZero"/>
         <c:crossBetween val="between"/>
       </c:valAx>
@@ -748,11 +752,11 @@
           <c:showBubbleSize val="0"/>
         </c:dLbls>
         <c:gapWidth val="150"/>
-        <c:axId val="2117573928"/>
-        <c:axId val="2115854664"/>
+        <c:axId val="-2142569752"/>
+        <c:axId val="-2142841128"/>
       </c:barChart>
       <c:catAx>
-        <c:axId val="2117573928"/>
+        <c:axId val="-2142569752"/>
         <c:scaling>
           <c:orientation val="minMax"/>
         </c:scaling>
@@ -762,7 +766,7 @@
         <c:majorTickMark val="out"/>
         <c:minorTickMark val="none"/>
         <c:tickLblPos val="nextTo"/>
-        <c:crossAx val="2115854664"/>
+        <c:crossAx val="-2142841128"/>
         <c:crosses val="autoZero"/>
         <c:auto val="1"/>
         <c:lblAlgn val="ctr"/>
@@ -770,7 +774,7 @@
         <c:noMultiLvlLbl val="0"/>
       </c:catAx>
       <c:valAx>
-        <c:axId val="2115854664"/>
+        <c:axId val="-2142841128"/>
         <c:scaling>
           <c:orientation val="minMax"/>
         </c:scaling>
@@ -781,7 +785,7 @@
         <c:majorTickMark val="out"/>
         <c:minorTickMark val="none"/>
         <c:tickLblPos val="nextTo"/>
-        <c:crossAx val="2117573928"/>
+        <c:crossAx val="-2142569752"/>
         <c:crosses val="autoZero"/>
         <c:crossBetween val="between"/>
       </c:valAx>
@@ -878,11 +882,11 @@
           <c:showBubbleSize val="0"/>
         </c:dLbls>
         <c:gapWidth val="150"/>
-        <c:axId val="2117657272"/>
-        <c:axId val="2117627336"/>
+        <c:axId val="-2147128424"/>
+        <c:axId val="-2142360552"/>
       </c:barChart>
       <c:catAx>
-        <c:axId val="2117657272"/>
+        <c:axId val="-2147128424"/>
         <c:scaling>
           <c:orientation val="minMax"/>
         </c:scaling>
@@ -892,7 +896,7 @@
         <c:majorTickMark val="out"/>
         <c:minorTickMark val="none"/>
         <c:tickLblPos val="nextTo"/>
-        <c:crossAx val="2117627336"/>
+        <c:crossAx val="-2142360552"/>
         <c:crosses val="autoZero"/>
         <c:auto val="1"/>
         <c:lblAlgn val="ctr"/>
@@ -900,7 +904,7 @@
         <c:noMultiLvlLbl val="0"/>
       </c:catAx>
       <c:valAx>
-        <c:axId val="2117627336"/>
+        <c:axId val="-2142360552"/>
         <c:scaling>
           <c:orientation val="minMax"/>
         </c:scaling>
@@ -911,7 +915,7 @@
         <c:majorTickMark val="out"/>
         <c:minorTickMark val="none"/>
         <c:tickLblPos val="nextTo"/>
-        <c:crossAx val="2117657272"/>
+        <c:crossAx val="-2147128424"/>
         <c:crosses val="autoZero"/>
         <c:crossBetween val="between"/>
       </c:valAx>
@@ -1008,11 +1012,11 @@
           <c:showBubbleSize val="0"/>
         </c:dLbls>
         <c:gapWidth val="150"/>
-        <c:axId val="2139204136"/>
-        <c:axId val="2118517432"/>
+        <c:axId val="-2092524680"/>
+        <c:axId val="-2111899672"/>
       </c:barChart>
       <c:catAx>
-        <c:axId val="2139204136"/>
+        <c:axId val="-2092524680"/>
         <c:scaling>
           <c:orientation val="minMax"/>
         </c:scaling>
@@ -1022,7 +1026,7 @@
         <c:majorTickMark val="out"/>
         <c:minorTickMark val="none"/>
         <c:tickLblPos val="nextTo"/>
-        <c:crossAx val="2118517432"/>
+        <c:crossAx val="-2111899672"/>
         <c:crosses val="autoZero"/>
         <c:auto val="1"/>
         <c:lblAlgn val="ctr"/>
@@ -1030,7 +1034,7 @@
         <c:noMultiLvlLbl val="0"/>
       </c:catAx>
       <c:valAx>
-        <c:axId val="2118517432"/>
+        <c:axId val="-2111899672"/>
         <c:scaling>
           <c:orientation val="minMax"/>
         </c:scaling>
@@ -1041,7 +1045,7 @@
         <c:majorTickMark val="out"/>
         <c:minorTickMark val="none"/>
         <c:tickLblPos val="nextTo"/>
-        <c:crossAx val="2139204136"/>
+        <c:crossAx val="-2092524680"/>
         <c:crosses val="autoZero"/>
         <c:crossBetween val="between"/>
       </c:valAx>
@@ -1538,7 +1542,7 @@
           <a:p>
             <a:fld id="{A9CFC120-02D4-4A43-835C-67B288774F94}" type="slidenum">
               <a:rPr lang="en-GB" smtClean="0"/>
-              <a:t>8</a:t>
+              <a:t>12</a:t>
             </a:fld>
             <a:endParaRPr lang="en-GB"/>
           </a:p>
@@ -1622,7 +1626,7 @@
           <a:p>
             <a:fld id="{A9CFC120-02D4-4A43-835C-67B288774F94}" type="slidenum">
               <a:rPr lang="en-GB" smtClean="0"/>
-              <a:t>9</a:t>
+              <a:t>13</a:t>
             </a:fld>
             <a:endParaRPr lang="en-GB"/>
           </a:p>
@@ -4595,6 +4599,606 @@
             <p:ph type="title"/>
           </p:nvPr>
         </p:nvSpPr>
+        <p:spPr/>
+        <p:txBody>
+          <a:bodyPr/>
+          <a:lstStyle/>
+          <a:p>
+            <a:r>
+              <a:rPr lang="en-GB" dirty="0" smtClean="0"/>
+              <a:t>About Page</a:t>
+            </a:r>
+            <a:endParaRPr lang="en-GB" dirty="0"/>
+          </a:p>
+        </p:txBody>
+      </p:sp>
+      <p:sp>
+        <p:nvSpPr>
+          <p:cNvPr id="3" name="Content Placeholder 2"/>
+          <p:cNvSpPr>
+            <a:spLocks noGrp="1"/>
+          </p:cNvSpPr>
+          <p:nvPr>
+            <p:ph idx="1"/>
+          </p:nvPr>
+        </p:nvSpPr>
+        <p:spPr>
+          <a:xfrm>
+            <a:off x="1981200" y="1600201"/>
+            <a:ext cx="8229600" cy="1828800"/>
+          </a:xfrm>
+        </p:spPr>
+        <p:txBody>
+          <a:bodyPr/>
+          <a:lstStyle/>
+          <a:p>
+            <a:r>
+              <a:rPr lang="en-GB" dirty="0" smtClean="0"/>
+              <a:t>No user input sections</a:t>
+            </a:r>
+          </a:p>
+          <a:p>
+            <a:r>
+              <a:rPr lang="en-GB" dirty="0" smtClean="0"/>
+              <a:t>Mostly textual information</a:t>
+            </a:r>
+          </a:p>
+          <a:p>
+            <a:r>
+              <a:rPr lang="en-GB" dirty="0" smtClean="0"/>
+              <a:t>Only 2 cosmetic defects encountered</a:t>
+            </a:r>
+            <a:endParaRPr lang="en-GB" dirty="0"/>
+          </a:p>
+        </p:txBody>
+      </p:sp>
+      <p:graphicFrame>
+        <p:nvGraphicFramePr>
+          <p:cNvPr id="4" name="Chart 3"/>
+          <p:cNvGraphicFramePr>
+            <a:graphicFrameLocks/>
+          </p:cNvGraphicFramePr>
+          <p:nvPr>
+            <p:extLst/>
+          </p:nvPr>
+        </p:nvGraphicFramePr>
+        <p:xfrm>
+          <a:off x="1991544" y="3573017"/>
+          <a:ext cx="4572000" cy="2802467"/>
+        </p:xfrm>
+        <a:graphic>
+          <a:graphicData uri="http://schemas.openxmlformats.org/drawingml/2006/chart">
+            <c:chart xmlns:c="http://schemas.openxmlformats.org/drawingml/2006/chart" xmlns:r="http://schemas.openxmlformats.org/officeDocument/2006/relationships" r:id="rId2"/>
+          </a:graphicData>
+        </a:graphic>
+      </p:graphicFrame>
+      <p:pic>
+        <p:nvPicPr>
+          <p:cNvPr id="5" name="Picture 4"/>
+          <p:cNvPicPr/>
+          <p:nvPr/>
+        </p:nvPicPr>
+        <p:blipFill>
+          <a:blip r:embed="rId3">
+            <a:extLst>
+              <a:ext uri="{28A0092B-C50C-407E-A947-70E740481C1C}">
+                <a14:useLocalDpi xmlns:a14="http://schemas.microsoft.com/office/drawing/2010/main" val="0"/>
+              </a:ext>
+            </a:extLst>
+          </a:blip>
+          <a:stretch>
+            <a:fillRect/>
+          </a:stretch>
+        </p:blipFill>
+        <p:spPr>
+          <a:xfrm>
+            <a:off x="7104112" y="4077072"/>
+            <a:ext cx="2659380" cy="1057910"/>
+          </a:xfrm>
+          <a:prstGeom prst="rect">
+            <a:avLst/>
+          </a:prstGeom>
+        </p:spPr>
+      </p:pic>
+    </p:spTree>
+    <p:extLst>
+      <p:ext uri="{BB962C8B-B14F-4D97-AF65-F5344CB8AC3E}">
+        <p14:creationId xmlns:p14="http://schemas.microsoft.com/office/powerpoint/2010/main" val="1335319840"/>
+      </p:ext>
+    </p:extLst>
+  </p:cSld>
+  <p:clrMapOvr>
+    <a:masterClrMapping/>
+  </p:clrMapOvr>
+</p:sld>
+</file>
+
+<file path=ppt/slides/slide11.xml><?xml version="1.0" encoding="utf-8"?>
+<p:sld xmlns:a="http://schemas.openxmlformats.org/drawingml/2006/main" xmlns:r="http://schemas.openxmlformats.org/officeDocument/2006/relationships" xmlns:p="http://schemas.openxmlformats.org/presentationml/2006/main">
+  <p:cSld>
+    <p:spTree>
+      <p:nvGrpSpPr>
+        <p:cNvPr id="1" name=""/>
+        <p:cNvGrpSpPr/>
+        <p:nvPr/>
+      </p:nvGrpSpPr>
+      <p:grpSpPr>
+        <a:xfrm>
+          <a:off x="0" y="0"/>
+          <a:ext cx="0" cy="0"/>
+          <a:chOff x="0" y="0"/>
+          <a:chExt cx="0" cy="0"/>
+        </a:xfrm>
+      </p:grpSpPr>
+      <p:sp>
+        <p:nvSpPr>
+          <p:cNvPr id="2" name="Title 1"/>
+          <p:cNvSpPr>
+            <a:spLocks noGrp="1"/>
+          </p:cNvSpPr>
+          <p:nvPr>
+            <p:ph type="title"/>
+          </p:nvPr>
+        </p:nvSpPr>
+        <p:spPr/>
+        <p:txBody>
+          <a:bodyPr/>
+          <a:lstStyle/>
+          <a:p>
+            <a:r>
+              <a:rPr lang="en-GB" dirty="0" smtClean="0"/>
+              <a:t>Contact</a:t>
+            </a:r>
+            <a:endParaRPr lang="en-GB" dirty="0"/>
+          </a:p>
+        </p:txBody>
+      </p:sp>
+      <p:sp>
+        <p:nvSpPr>
+          <p:cNvPr id="3" name="Content Placeholder 2"/>
+          <p:cNvSpPr>
+            <a:spLocks noGrp="1"/>
+          </p:cNvSpPr>
+          <p:nvPr>
+            <p:ph idx="1"/>
+          </p:nvPr>
+        </p:nvSpPr>
+        <p:spPr/>
+        <p:txBody>
+          <a:bodyPr/>
+          <a:lstStyle/>
+          <a:p>
+            <a:endParaRPr lang="en-GB"/>
+          </a:p>
+        </p:txBody>
+      </p:sp>
+    </p:spTree>
+    <p:extLst>
+      <p:ext uri="{BB962C8B-B14F-4D97-AF65-F5344CB8AC3E}">
+        <p14:creationId xmlns:p14="http://schemas.microsoft.com/office/powerpoint/2010/main" val="1488213605"/>
+      </p:ext>
+    </p:extLst>
+  </p:cSld>
+  <p:clrMapOvr>
+    <a:masterClrMapping/>
+  </p:clrMapOvr>
+</p:sld>
+</file>
+
+<file path=ppt/slides/slide12.xml><?xml version="1.0" encoding="utf-8"?>
+<p:sld xmlns:a="http://schemas.openxmlformats.org/drawingml/2006/main" xmlns:r="http://schemas.openxmlformats.org/officeDocument/2006/relationships" xmlns:p="http://schemas.openxmlformats.org/presentationml/2006/main">
+  <p:cSld>
+    <p:spTree>
+      <p:nvGrpSpPr>
+        <p:cNvPr id="1" name=""/>
+        <p:cNvGrpSpPr/>
+        <p:nvPr/>
+      </p:nvGrpSpPr>
+      <p:grpSpPr>
+        <a:xfrm>
+          <a:off x="0" y="0"/>
+          <a:ext cx="0" cy="0"/>
+          <a:chOff x="0" y="0"/>
+          <a:chExt cx="0" cy="0"/>
+        </a:xfrm>
+      </p:grpSpPr>
+      <p:sp>
+        <p:nvSpPr>
+          <p:cNvPr id="2" name="Title 1"/>
+          <p:cNvSpPr>
+            <a:spLocks noGrp="1"/>
+          </p:cNvSpPr>
+          <p:nvPr>
+            <p:ph type="title"/>
+          </p:nvPr>
+        </p:nvSpPr>
+        <p:spPr/>
+        <p:txBody>
+          <a:bodyPr/>
+          <a:lstStyle/>
+          <a:p>
+            <a:r>
+              <a:rPr lang="en-GB" dirty="0" smtClean="0"/>
+              <a:t>Forgot Password Page</a:t>
+            </a:r>
+            <a:endParaRPr lang="en-GB" dirty="0"/>
+          </a:p>
+        </p:txBody>
+      </p:sp>
+      <p:sp>
+        <p:nvSpPr>
+          <p:cNvPr id="3" name="Content Placeholder 2"/>
+          <p:cNvSpPr>
+            <a:spLocks noGrp="1"/>
+          </p:cNvSpPr>
+          <p:nvPr>
+            <p:ph idx="1"/>
+          </p:nvPr>
+        </p:nvSpPr>
+        <p:spPr>
+          <a:xfrm>
+            <a:off x="1981200" y="1600202"/>
+            <a:ext cx="4762872" cy="2116831"/>
+          </a:xfrm>
+        </p:spPr>
+        <p:txBody>
+          <a:bodyPr>
+            <a:normAutofit fontScale="92500" lnSpcReduction="10000"/>
+          </a:bodyPr>
+          <a:lstStyle/>
+          <a:p>
+            <a:r>
+              <a:rPr lang="en-GB" dirty="0" smtClean="0"/>
+              <a:t>One minor defect</a:t>
+            </a:r>
+          </a:p>
+          <a:p>
+            <a:r>
+              <a:rPr lang="en-GB" dirty="0"/>
+              <a:t>E</a:t>
+            </a:r>
+            <a:r>
+              <a:rPr lang="en-GB" dirty="0" smtClean="0"/>
+              <a:t>mail subject reads “Bike IT – account details”</a:t>
+            </a:r>
+          </a:p>
+          <a:p>
+            <a:r>
+              <a:rPr lang="en-GB" dirty="0" smtClean="0"/>
+              <a:t>Appears unprofessional</a:t>
+            </a:r>
+          </a:p>
+          <a:p>
+            <a:r>
+              <a:rPr lang="en-GB" dirty="0" smtClean="0"/>
+              <a:t>Three cosmetic defects</a:t>
+            </a:r>
+          </a:p>
+        </p:txBody>
+      </p:sp>
+      <p:pic>
+        <p:nvPicPr>
+          <p:cNvPr id="5" name="Picture 4"/>
+          <p:cNvPicPr/>
+          <p:nvPr/>
+        </p:nvPicPr>
+        <p:blipFill>
+          <a:blip r:embed="rId3">
+            <a:extLst>
+              <a:ext uri="{28A0092B-C50C-407E-A947-70E740481C1C}">
+                <a14:useLocalDpi xmlns:a14="http://schemas.microsoft.com/office/drawing/2010/main" val="0"/>
+              </a:ext>
+            </a:extLst>
+          </a:blip>
+          <a:stretch>
+            <a:fillRect/>
+          </a:stretch>
+        </p:blipFill>
+        <p:spPr>
+          <a:xfrm>
+            <a:off x="7104112" y="4077072"/>
+            <a:ext cx="2659380" cy="1057910"/>
+          </a:xfrm>
+          <a:prstGeom prst="rect">
+            <a:avLst/>
+          </a:prstGeom>
+        </p:spPr>
+      </p:pic>
+      <p:graphicFrame>
+        <p:nvGraphicFramePr>
+          <p:cNvPr id="6" name="Chart 5"/>
+          <p:cNvGraphicFramePr>
+            <a:graphicFrameLocks/>
+          </p:cNvGraphicFramePr>
+          <p:nvPr>
+            <p:extLst/>
+          </p:nvPr>
+        </p:nvGraphicFramePr>
+        <p:xfrm>
+          <a:off x="2135560" y="3733749"/>
+          <a:ext cx="4572000" cy="2802467"/>
+        </p:xfrm>
+        <a:graphic>
+          <a:graphicData uri="http://schemas.openxmlformats.org/drawingml/2006/chart">
+            <c:chart xmlns:c="http://schemas.openxmlformats.org/drawingml/2006/chart" xmlns:r="http://schemas.openxmlformats.org/officeDocument/2006/relationships" r:id="rId4"/>
+          </a:graphicData>
+        </a:graphic>
+      </p:graphicFrame>
+      <p:pic>
+        <p:nvPicPr>
+          <p:cNvPr id="7" name="Picture 6"/>
+          <p:cNvPicPr>
+            <a:picLocks noChangeAspect="1"/>
+          </p:cNvPicPr>
+          <p:nvPr/>
+        </p:nvPicPr>
+        <p:blipFill rotWithShape="1">
+          <a:blip r:embed="rId5"/>
+          <a:srcRect l="40401" t="14765" r="38568" b="55704"/>
+          <a:stretch/>
+        </p:blipFill>
+        <p:spPr>
+          <a:xfrm>
+            <a:off x="7104113" y="1600201"/>
+            <a:ext cx="2863741" cy="2260847"/>
+          </a:xfrm>
+          <a:prstGeom prst="rect">
+            <a:avLst/>
+          </a:prstGeom>
+        </p:spPr>
+      </p:pic>
+    </p:spTree>
+    <p:extLst>
+      <p:ext uri="{BB962C8B-B14F-4D97-AF65-F5344CB8AC3E}">
+        <p14:creationId xmlns:p14="http://schemas.microsoft.com/office/powerpoint/2010/main" val="13974448"/>
+      </p:ext>
+    </p:extLst>
+  </p:cSld>
+  <p:clrMapOvr>
+    <a:masterClrMapping/>
+  </p:clrMapOvr>
+</p:sld>
+</file>
+
+<file path=ppt/slides/slide13.xml><?xml version="1.0" encoding="utf-8"?>
+<p:sld xmlns:a="http://schemas.openxmlformats.org/drawingml/2006/main" xmlns:r="http://schemas.openxmlformats.org/officeDocument/2006/relationships" xmlns:p="http://schemas.openxmlformats.org/presentationml/2006/main">
+  <p:cSld>
+    <p:spTree>
+      <p:nvGrpSpPr>
+        <p:cNvPr id="1" name=""/>
+        <p:cNvGrpSpPr/>
+        <p:nvPr/>
+      </p:nvGrpSpPr>
+      <p:grpSpPr>
+        <a:xfrm>
+          <a:off x="0" y="0"/>
+          <a:ext cx="0" cy="0"/>
+          <a:chOff x="0" y="0"/>
+          <a:chExt cx="0" cy="0"/>
+        </a:xfrm>
+      </p:grpSpPr>
+      <p:sp>
+        <p:nvSpPr>
+          <p:cNvPr id="2" name="Title 1"/>
+          <p:cNvSpPr>
+            <a:spLocks noGrp="1"/>
+          </p:cNvSpPr>
+          <p:nvPr>
+            <p:ph type="title"/>
+          </p:nvPr>
+        </p:nvSpPr>
+        <p:spPr>
+          <a:xfrm>
+            <a:off x="1991544" y="188640"/>
+            <a:ext cx="8229600" cy="1143000"/>
+          </a:xfrm>
+        </p:spPr>
+        <p:txBody>
+          <a:bodyPr/>
+          <a:lstStyle/>
+          <a:p>
+            <a:r>
+              <a:rPr lang="en-GB" dirty="0" smtClean="0"/>
+              <a:t>Schedule Order Page</a:t>
+            </a:r>
+            <a:endParaRPr lang="en-GB" dirty="0"/>
+          </a:p>
+        </p:txBody>
+      </p:sp>
+      <p:sp>
+        <p:nvSpPr>
+          <p:cNvPr id="3" name="Content Placeholder 2"/>
+          <p:cNvSpPr>
+            <a:spLocks noGrp="1"/>
+          </p:cNvSpPr>
+          <p:nvPr>
+            <p:ph idx="1"/>
+          </p:nvPr>
+        </p:nvSpPr>
+        <p:spPr>
+          <a:xfrm>
+            <a:off x="1847528" y="1478851"/>
+            <a:ext cx="8136904" cy="4536504"/>
+          </a:xfrm>
+        </p:spPr>
+        <p:txBody>
+          <a:bodyPr>
+            <a:noAutofit/>
+          </a:bodyPr>
+          <a:lstStyle/>
+          <a:p>
+            <a:r>
+              <a:rPr lang="en-GB" sz="2200" dirty="0"/>
+              <a:t>1 Moderate, 7 Major, 4 Critical defects</a:t>
+            </a:r>
+          </a:p>
+          <a:p>
+            <a:r>
+              <a:rPr lang="en-GB" sz="2200" dirty="0"/>
+              <a:t>Critical defects were caused by the order validation button still working after trying to order beyond the limit of one week in the ‘Later Service’</a:t>
+            </a:r>
+          </a:p>
+          <a:p>
+            <a:r>
+              <a:rPr lang="en-GB" sz="2200" dirty="0"/>
+              <a:t>Automated Selenium Tests caused Major defects in testing as </a:t>
+            </a:r>
+          </a:p>
+          <a:p>
+            <a:pPr marL="0" indent="0">
+              <a:buNone/>
+            </a:pPr>
+            <a:r>
+              <a:rPr lang="en-GB" sz="2200" dirty="0"/>
+              <a:t>      the pop up boxes would cause ‘time </a:t>
+            </a:r>
+          </a:p>
+          <a:p>
+            <a:pPr marL="0" indent="0">
+              <a:buNone/>
+            </a:pPr>
+            <a:r>
+              <a:rPr lang="en-GB" sz="2200" dirty="0"/>
+              <a:t>      outs’ before moving onto the next page</a:t>
+            </a:r>
+          </a:p>
+          <a:p>
+            <a:r>
+              <a:rPr lang="en-GB" sz="2200" dirty="0"/>
+              <a:t>Moderate and Exploratory issues such as </a:t>
+            </a:r>
+          </a:p>
+          <a:p>
+            <a:pPr marL="0" indent="0">
+              <a:buNone/>
+            </a:pPr>
+            <a:r>
+              <a:rPr lang="en-GB" sz="2200" dirty="0"/>
+              <a:t>      the ‘Now Service’ showing collection time </a:t>
+            </a:r>
+          </a:p>
+          <a:p>
+            <a:pPr marL="0" indent="0">
+              <a:buNone/>
+            </a:pPr>
+            <a:r>
+              <a:rPr lang="en-GB" sz="2200" dirty="0"/>
+              <a:t>      is 10 </a:t>
+            </a:r>
+            <a:r>
+              <a:rPr lang="en-GB" sz="2200" dirty="0" err="1"/>
+              <a:t>mins</a:t>
+            </a:r>
+            <a:r>
+              <a:rPr lang="en-GB" sz="2200" dirty="0"/>
+              <a:t> over what is expected </a:t>
+            </a:r>
+          </a:p>
+          <a:p>
+            <a:pPr marL="0" indent="0">
+              <a:buNone/>
+            </a:pPr>
+            <a:r>
+              <a:rPr lang="en-GB" sz="2200" dirty="0"/>
+              <a:t>      </a:t>
+            </a:r>
+          </a:p>
+          <a:p>
+            <a:pPr marL="0" indent="0">
+              <a:buNone/>
+            </a:pPr>
+            <a:endParaRPr lang="en-GB" sz="2200" dirty="0"/>
+          </a:p>
+        </p:txBody>
+      </p:sp>
+      <p:pic>
+        <p:nvPicPr>
+          <p:cNvPr id="5" name="Picture 4"/>
+          <p:cNvPicPr/>
+          <p:nvPr/>
+        </p:nvPicPr>
+        <p:blipFill>
+          <a:blip r:embed="rId3">
+            <a:extLst>
+              <a:ext uri="{28A0092B-C50C-407E-A947-70E740481C1C}">
+                <a14:useLocalDpi xmlns:a14="http://schemas.microsoft.com/office/drawing/2010/main" val="0"/>
+              </a:ext>
+            </a:extLst>
+          </a:blip>
+          <a:stretch>
+            <a:fillRect/>
+          </a:stretch>
+        </p:blipFill>
+        <p:spPr>
+          <a:xfrm>
+            <a:off x="3143672" y="5517232"/>
+            <a:ext cx="2659380" cy="1057910"/>
+          </a:xfrm>
+          <a:prstGeom prst="rect">
+            <a:avLst/>
+          </a:prstGeom>
+        </p:spPr>
+      </p:pic>
+      <p:graphicFrame>
+        <p:nvGraphicFramePr>
+          <p:cNvPr id="9" name="Chart 8"/>
+          <p:cNvGraphicFramePr>
+            <a:graphicFrameLocks/>
+          </p:cNvGraphicFramePr>
+          <p:nvPr>
+            <p:extLst/>
+          </p:nvPr>
+        </p:nvGraphicFramePr>
+        <p:xfrm>
+          <a:off x="7464152" y="3645025"/>
+          <a:ext cx="2941390" cy="2870161"/>
+        </p:xfrm>
+        <a:graphic>
+          <a:graphicData uri="http://schemas.openxmlformats.org/drawingml/2006/chart">
+            <c:chart xmlns:c="http://schemas.openxmlformats.org/drawingml/2006/chart" xmlns:r="http://schemas.openxmlformats.org/officeDocument/2006/relationships" r:id="rId4"/>
+          </a:graphicData>
+        </a:graphic>
+      </p:graphicFrame>
+    </p:spTree>
+    <p:extLst>
+      <p:ext uri="{BB962C8B-B14F-4D97-AF65-F5344CB8AC3E}">
+        <p14:creationId xmlns:p14="http://schemas.microsoft.com/office/powerpoint/2010/main" val="3003426415"/>
+      </p:ext>
+    </p:extLst>
+  </p:cSld>
+  <p:clrMapOvr>
+    <a:masterClrMapping/>
+  </p:clrMapOvr>
+</p:sld>
+</file>
+
+<file path=ppt/slides/slide14.xml><?xml version="1.0" encoding="utf-8"?>
+<p:sld xmlns:a="http://schemas.openxmlformats.org/drawingml/2006/main" xmlns:r="http://schemas.openxmlformats.org/officeDocument/2006/relationships" xmlns:p="http://schemas.openxmlformats.org/presentationml/2006/main">
+  <p:cSld>
+    <p:spTree>
+      <p:nvGrpSpPr>
+        <p:cNvPr id="1" name=""/>
+        <p:cNvGrpSpPr/>
+        <p:nvPr/>
+      </p:nvGrpSpPr>
+      <p:grpSpPr>
+        <a:xfrm>
+          <a:off x="0" y="0"/>
+          <a:ext cx="0" cy="0"/>
+          <a:chOff x="0" y="0"/>
+          <a:chExt cx="0" cy="0"/>
+        </a:xfrm>
+      </p:grpSpPr>
+      <p:sp>
+        <p:nvSpPr>
+          <p:cNvPr id="2" name="Title 1"/>
+          <p:cNvSpPr>
+            <a:spLocks noGrp="1"/>
+          </p:cNvSpPr>
+          <p:nvPr>
+            <p:ph type="title"/>
+          </p:nvPr>
+        </p:nvSpPr>
         <p:spPr>
           <a:xfrm>
             <a:off x="1981201" y="150404"/>
@@ -4845,7 +5449,7 @@
 </p:sld>
 </file>
 
-<file path=ppt/slides/slide11.xml><?xml version="1.0" encoding="utf-8"?>
+<file path=ppt/slides/slide15.xml><?xml version="1.0" encoding="utf-8"?>
 <p:sld xmlns:a="http://schemas.openxmlformats.org/drawingml/2006/main" xmlns:r="http://schemas.openxmlformats.org/officeDocument/2006/relationships" xmlns:p="http://schemas.openxmlformats.org/presentationml/2006/main">
   <p:cSld>
     <p:spTree>
@@ -5178,6 +5782,841 @@
       </p:grpSpPr>
       <p:sp>
         <p:nvSpPr>
+          <p:cNvPr id="2" name="Title 1"/>
+          <p:cNvSpPr>
+            <a:spLocks noGrp="1"/>
+          </p:cNvSpPr>
+          <p:nvPr>
+            <p:ph type="title"/>
+          </p:nvPr>
+        </p:nvSpPr>
+        <p:spPr>
+          <a:xfrm>
+            <a:off x="0" y="0"/>
+            <a:ext cx="10515600" cy="1325563"/>
+          </a:xfrm>
+        </p:spPr>
+        <p:txBody>
+          <a:bodyPr>
+            <a:normAutofit/>
+          </a:bodyPr>
+          <a:lstStyle/>
+          <a:p>
+            <a:r>
+              <a:rPr lang="en-GB" sz="1400" dirty="0" smtClean="0"/>
+              <a:t>Order Pizza</a:t>
+            </a:r>
+            <a:endParaRPr lang="en-GB" sz="1400" dirty="0"/>
+          </a:p>
+        </p:txBody>
+      </p:sp>
+      <p:sp>
+        <p:nvSpPr>
+          <p:cNvPr id="3" name="Content Placeholder 2"/>
+          <p:cNvSpPr>
+            <a:spLocks noGrp="1"/>
+          </p:cNvSpPr>
+          <p:nvPr>
+            <p:ph idx="1"/>
+          </p:nvPr>
+        </p:nvSpPr>
+        <p:spPr>
+          <a:xfrm>
+            <a:off x="617860" y="1046826"/>
+            <a:ext cx="11069984" cy="5628837"/>
+          </a:xfrm>
+        </p:spPr>
+        <p:txBody>
+          <a:bodyPr>
+            <a:normAutofit fontScale="92500"/>
+          </a:bodyPr>
+          <a:lstStyle/>
+          <a:p>
+            <a:pPr marL="285750" indent="-285750">
+              <a:buFont typeface="Arial"/>
+              <a:buChar char="•"/>
+            </a:pPr>
+            <a:r>
+              <a:rPr lang="en-US" dirty="0"/>
+              <a:t>Inability to remove a pizza in Internet Explorer 11 produces a set of critical defects. Fixing the “remove” button code likely will have a domino-effect, resolving all listed critical defects. Fixing the remove button will render the page functional on the most recent version of that browser</a:t>
+            </a:r>
+            <a:r>
+              <a:rPr lang="en-US" dirty="0" smtClean="0"/>
+              <a:t>.</a:t>
+            </a:r>
+          </a:p>
+          <a:p>
+            <a:pPr marL="285750" indent="-285750">
+              <a:buFont typeface="Arial"/>
+              <a:buChar char="•"/>
+            </a:pPr>
+            <a:r>
+              <a:rPr lang="en-US" dirty="0"/>
+              <a:t>If item is in the shopping basket and user navigates to the Home page, Ordering Page, About Page or Contact page and then tries to navigate back to the Ordering Pizza page, the Schedule page eventuates. No means of being able to navigate back via navigation to the Ordering Pizza</a:t>
+            </a:r>
+            <a:r>
+              <a:rPr lang="en-US" dirty="0" smtClean="0"/>
+              <a:t>.</a:t>
+            </a:r>
+          </a:p>
+          <a:p>
+            <a:pPr marL="285750" indent="-285750">
+              <a:buFont typeface="Arial"/>
+              <a:buChar char="•"/>
+            </a:pPr>
+            <a:r>
+              <a:rPr lang="en-US" dirty="0" smtClean="0"/>
+              <a:t>Major </a:t>
+            </a:r>
+            <a:r>
+              <a:rPr lang="en-US" dirty="0"/>
+              <a:t>defects flow from minor inaccuracies in the coded prices for the Meat Extravaganza pizza and the Peppers topping. Correcting these errors at the source likely will redress related major defects listed downstream</a:t>
+            </a:r>
+            <a:r>
+              <a:rPr lang="en-US" dirty="0" smtClean="0"/>
+              <a:t>.</a:t>
+            </a:r>
+          </a:p>
+          <a:p>
+            <a:pPr marL="285750" indent="-285750">
+              <a:buFont typeface="Arial"/>
+              <a:buChar char="•"/>
+            </a:pPr>
+            <a:r>
+              <a:rPr lang="en-US" dirty="0" smtClean="0"/>
+              <a:t>This holds true for the onions not adding to the Cheese Pizza.</a:t>
+            </a:r>
+            <a:endParaRPr lang="en-US" dirty="0"/>
+          </a:p>
+          <a:p>
+            <a:pPr marL="285750" indent="-285750">
+              <a:buFont typeface="Arial"/>
+              <a:buChar char="•"/>
+            </a:pPr>
+            <a:r>
+              <a:rPr lang="en-US" dirty="0"/>
+              <a:t>Price freeze after £100 in the basket. </a:t>
+            </a:r>
+          </a:p>
+          <a:p>
+            <a:endParaRPr lang="en-US" dirty="0"/>
+          </a:p>
+          <a:p>
+            <a:endParaRPr lang="en-GB" dirty="0"/>
+          </a:p>
+        </p:txBody>
+      </p:sp>
+    </p:spTree>
+    <p:extLst>
+      <p:ext uri="{BB962C8B-B14F-4D97-AF65-F5344CB8AC3E}">
+        <p14:creationId xmlns:p14="http://schemas.microsoft.com/office/powerpoint/2010/main" val="736551483"/>
+      </p:ext>
+    </p:extLst>
+  </p:cSld>
+  <p:clrMapOvr>
+    <a:masterClrMapping/>
+  </p:clrMapOvr>
+</p:sld>
+</file>
+
+<file path=ppt/slides/slide3.xml><?xml version="1.0" encoding="utf-8"?>
+<p:sld xmlns:a="http://schemas.openxmlformats.org/drawingml/2006/main" xmlns:r="http://schemas.openxmlformats.org/officeDocument/2006/relationships" xmlns:p="http://schemas.openxmlformats.org/presentationml/2006/main">
+  <p:cSld>
+    <p:spTree>
+      <p:nvGrpSpPr>
+        <p:cNvPr id="1" name=""/>
+        <p:cNvGrpSpPr/>
+        <p:nvPr/>
+      </p:nvGrpSpPr>
+      <p:grpSpPr>
+        <a:xfrm>
+          <a:off x="0" y="0"/>
+          <a:ext cx="0" cy="0"/>
+          <a:chOff x="0" y="0"/>
+          <a:chExt cx="0" cy="0"/>
+        </a:xfrm>
+      </p:grpSpPr>
+      <p:sp>
+        <p:nvSpPr>
+          <p:cNvPr id="3" name="Content Placeholder 2"/>
+          <p:cNvSpPr>
+            <a:spLocks noGrp="1"/>
+          </p:cNvSpPr>
+          <p:nvPr>
+            <p:ph idx="1"/>
+          </p:nvPr>
+        </p:nvSpPr>
+        <p:spPr>
+          <a:xfrm>
+            <a:off x="754743" y="1769533"/>
+            <a:ext cx="10518019" cy="4525963"/>
+          </a:xfrm>
+        </p:spPr>
+        <p:txBody>
+          <a:bodyPr>
+            <a:normAutofit/>
+          </a:bodyPr>
+          <a:lstStyle/>
+          <a:p>
+            <a:r>
+              <a:rPr lang="en-US" sz="2800" dirty="0" smtClean="0"/>
+              <a:t>Myriad cosmetic and minor that could be corrected if the page is being revisited anyway. E.g. Pizza descriptions.</a:t>
+            </a:r>
+          </a:p>
+          <a:p>
+            <a:endParaRPr lang="en-US" sz="2800" dirty="0"/>
+          </a:p>
+          <a:p>
+            <a:r>
+              <a:rPr lang="en-US" sz="2800" dirty="0" smtClean="0"/>
+              <a:t>Many classified moderates are negated once source problems (chiefly, the pizza prices) are corrected.</a:t>
+            </a:r>
+          </a:p>
+        </p:txBody>
+      </p:sp>
+    </p:spTree>
+    <p:extLst>
+      <p:ext uri="{BB962C8B-B14F-4D97-AF65-F5344CB8AC3E}">
+        <p14:creationId xmlns:p14="http://schemas.microsoft.com/office/powerpoint/2010/main" val="252485138"/>
+      </p:ext>
+    </p:extLst>
+  </p:cSld>
+  <p:clrMapOvr>
+    <a:masterClrMapping/>
+  </p:clrMapOvr>
+</p:sld>
+</file>
+
+<file path=ppt/slides/slide4.xml><?xml version="1.0" encoding="utf-8"?>
+<p:sld xmlns:a="http://schemas.openxmlformats.org/drawingml/2006/main" xmlns:r="http://schemas.openxmlformats.org/officeDocument/2006/relationships" xmlns:p="http://schemas.openxmlformats.org/presentationml/2006/main">
+  <p:cSld>
+    <p:spTree>
+      <p:nvGrpSpPr>
+        <p:cNvPr id="1" name=""/>
+        <p:cNvGrpSpPr/>
+        <p:nvPr/>
+      </p:nvGrpSpPr>
+      <p:grpSpPr>
+        <a:xfrm>
+          <a:off x="0" y="0"/>
+          <a:ext cx="0" cy="0"/>
+          <a:chOff x="0" y="0"/>
+          <a:chExt cx="0" cy="0"/>
+        </a:xfrm>
+      </p:grpSpPr>
+      <p:pic>
+        <p:nvPicPr>
+          <p:cNvPr id="11" name="Picture 10" descr="1-2.png"/>
+          <p:cNvPicPr>
+            <a:picLocks noChangeAspect="1"/>
+          </p:cNvPicPr>
+          <p:nvPr/>
+        </p:nvPicPr>
+        <p:blipFill>
+          <a:blip r:embed="rId2">
+            <a:extLst>
+              <a:ext uri="{28A0092B-C50C-407E-A947-70E740481C1C}">
+                <a14:useLocalDpi xmlns:a14="http://schemas.microsoft.com/office/drawing/2010/main" val="0"/>
+              </a:ext>
+            </a:extLst>
+          </a:blip>
+          <a:stretch>
+            <a:fillRect/>
+          </a:stretch>
+        </p:blipFill>
+        <p:spPr>
+          <a:xfrm>
+            <a:off x="218452" y="202192"/>
+            <a:ext cx="6236401" cy="4212476"/>
+          </a:xfrm>
+          <a:prstGeom prst="rect">
+            <a:avLst/>
+          </a:prstGeom>
+        </p:spPr>
+      </p:pic>
+      <p:sp>
+        <p:nvSpPr>
+          <p:cNvPr id="13" name="Content Placeholder 2"/>
+          <p:cNvSpPr>
+            <a:spLocks noGrp="1"/>
+          </p:cNvSpPr>
+          <p:nvPr>
+            <p:ph idx="1"/>
+          </p:nvPr>
+        </p:nvSpPr>
+        <p:spPr>
+          <a:xfrm>
+            <a:off x="218451" y="4442488"/>
+            <a:ext cx="6953956" cy="988181"/>
+          </a:xfrm>
+        </p:spPr>
+        <p:txBody>
+          <a:bodyPr>
+            <a:normAutofit/>
+          </a:bodyPr>
+          <a:lstStyle/>
+          <a:p>
+            <a:pPr marL="0" indent="0">
+              <a:buNone/>
+            </a:pPr>
+            <a:r>
+              <a:rPr lang="en-US" sz="2800" dirty="0" smtClean="0"/>
+              <a:t>Meat Extravaganza – price £7.49.</a:t>
+            </a:r>
+          </a:p>
+        </p:txBody>
+      </p:sp>
+    </p:spTree>
+    <p:extLst>
+      <p:ext uri="{BB962C8B-B14F-4D97-AF65-F5344CB8AC3E}">
+        <p14:creationId xmlns:p14="http://schemas.microsoft.com/office/powerpoint/2010/main" val="1789963796"/>
+      </p:ext>
+    </p:extLst>
+  </p:cSld>
+  <p:clrMapOvr>
+    <a:masterClrMapping/>
+  </p:clrMapOvr>
+</p:sld>
+</file>
+
+<file path=ppt/slides/slide5.xml><?xml version="1.0" encoding="utf-8"?>
+<p:sld xmlns:a="http://schemas.openxmlformats.org/drawingml/2006/main" xmlns:r="http://schemas.openxmlformats.org/officeDocument/2006/relationships" xmlns:p="http://schemas.openxmlformats.org/presentationml/2006/main">
+  <p:cSld>
+    <p:spTree>
+      <p:nvGrpSpPr>
+        <p:cNvPr id="1" name=""/>
+        <p:cNvGrpSpPr/>
+        <p:nvPr/>
+      </p:nvGrpSpPr>
+      <p:grpSpPr>
+        <a:xfrm>
+          <a:off x="0" y="0"/>
+          <a:ext cx="0" cy="0"/>
+          <a:chOff x="0" y="0"/>
+          <a:chExt cx="0" cy="0"/>
+        </a:xfrm>
+      </p:grpSpPr>
+      <p:pic>
+        <p:nvPicPr>
+          <p:cNvPr id="6" name="Content Placeholder 5" descr="7.png"/>
+          <p:cNvPicPr>
+            <a:picLocks noGrp="1" noChangeAspect="1"/>
+          </p:cNvPicPr>
+          <p:nvPr>
+            <p:ph idx="1"/>
+          </p:nvPr>
+        </p:nvPicPr>
+        <p:blipFill>
+          <a:blip r:embed="rId2">
+            <a:extLst>
+              <a:ext uri="{28A0092B-C50C-407E-A947-70E740481C1C}">
+                <a14:useLocalDpi xmlns:a14="http://schemas.microsoft.com/office/drawing/2010/main" val="0"/>
+              </a:ext>
+            </a:extLst>
+          </a:blip>
+          <a:srcRect l="-39103" r="-39103"/>
+          <a:stretch>
+            <a:fillRect/>
+          </a:stretch>
+        </p:blipFill>
+        <p:spPr>
+          <a:xfrm>
+            <a:off x="-2414209" y="3630"/>
+            <a:ext cx="10972800" cy="4525963"/>
+          </a:xfrm>
+          <a:prstGeom prst="rect">
+            <a:avLst/>
+          </a:prstGeom>
+        </p:spPr>
+      </p:pic>
+      <p:sp>
+        <p:nvSpPr>
+          <p:cNvPr id="8" name="Content Placeholder 2"/>
+          <p:cNvSpPr txBox="1">
+            <a:spLocks/>
+          </p:cNvSpPr>
+          <p:nvPr/>
+        </p:nvSpPr>
+        <p:spPr>
+          <a:xfrm>
+            <a:off x="7124902" y="3629"/>
+            <a:ext cx="4518781" cy="3649134"/>
+          </a:xfrm>
+          <a:prstGeom prst="rect">
+            <a:avLst/>
+          </a:prstGeom>
+        </p:spPr>
+        <p:txBody>
+          <a:bodyPr vert="horz" lIns="91440" tIns="45720" rIns="91440" bIns="45720" rtlCol="0">
+            <a:normAutofit/>
+          </a:bodyPr>
+          <a:lstStyle>
+            <a:lvl1pPr marL="342900" indent="-342900" algn="l" defTabSz="457200" rtl="0" eaLnBrk="1" latinLnBrk="0" hangingPunct="1">
+              <a:spcBef>
+                <a:spcPct val="20000"/>
+              </a:spcBef>
+              <a:buFont typeface="Arial"/>
+              <a:buChar char="•"/>
+              <a:defRPr sz="3200" kern="1200">
+                <a:solidFill>
+                  <a:schemeClr val="tx1"/>
+                </a:solidFill>
+                <a:latin typeface="+mn-lt"/>
+                <a:ea typeface="+mn-ea"/>
+                <a:cs typeface="+mn-cs"/>
+              </a:defRPr>
+            </a:lvl1pPr>
+            <a:lvl2pPr marL="742950" indent="-285750" algn="l" defTabSz="457200" rtl="0" eaLnBrk="1" latinLnBrk="0" hangingPunct="1">
+              <a:spcBef>
+                <a:spcPct val="20000"/>
+              </a:spcBef>
+              <a:buFont typeface="Arial"/>
+              <a:buChar char="–"/>
+              <a:defRPr sz="2800" kern="1200">
+                <a:solidFill>
+                  <a:schemeClr val="tx1"/>
+                </a:solidFill>
+                <a:latin typeface="+mn-lt"/>
+                <a:ea typeface="+mn-ea"/>
+                <a:cs typeface="+mn-cs"/>
+              </a:defRPr>
+            </a:lvl2pPr>
+            <a:lvl3pPr marL="1143000" indent="-228600" algn="l" defTabSz="457200" rtl="0" eaLnBrk="1" latinLnBrk="0" hangingPunct="1">
+              <a:spcBef>
+                <a:spcPct val="20000"/>
+              </a:spcBef>
+              <a:buFont typeface="Arial"/>
+              <a:buChar char="•"/>
+              <a:defRPr sz="2400" kern="1200">
+                <a:solidFill>
+                  <a:schemeClr val="tx1"/>
+                </a:solidFill>
+                <a:latin typeface="+mn-lt"/>
+                <a:ea typeface="+mn-ea"/>
+                <a:cs typeface="+mn-cs"/>
+              </a:defRPr>
+            </a:lvl3pPr>
+            <a:lvl4pPr marL="1600200" indent="-228600" algn="l" defTabSz="457200" rtl="0" eaLnBrk="1" latinLnBrk="0" hangingPunct="1">
+              <a:spcBef>
+                <a:spcPct val="20000"/>
+              </a:spcBef>
+              <a:buFont typeface="Arial"/>
+              <a:buChar char="–"/>
+              <a:defRPr sz="2000" kern="1200">
+                <a:solidFill>
+                  <a:schemeClr val="tx1"/>
+                </a:solidFill>
+                <a:latin typeface="+mn-lt"/>
+                <a:ea typeface="+mn-ea"/>
+                <a:cs typeface="+mn-cs"/>
+              </a:defRPr>
+            </a:lvl4pPr>
+            <a:lvl5pPr marL="2057400" indent="-228600" algn="l" defTabSz="457200" rtl="0" eaLnBrk="1" latinLnBrk="0" hangingPunct="1">
+              <a:spcBef>
+                <a:spcPct val="20000"/>
+              </a:spcBef>
+              <a:buFont typeface="Arial"/>
+              <a:buChar char="»"/>
+              <a:defRPr sz="2000" kern="1200">
+                <a:solidFill>
+                  <a:schemeClr val="tx1"/>
+                </a:solidFill>
+                <a:latin typeface="+mn-lt"/>
+                <a:ea typeface="+mn-ea"/>
+                <a:cs typeface="+mn-cs"/>
+              </a:defRPr>
+            </a:lvl5pPr>
+            <a:lvl6pPr marL="2514600" indent="-228600" algn="l" defTabSz="457200" rtl="0" eaLnBrk="1" latinLnBrk="0" hangingPunct="1">
+              <a:spcBef>
+                <a:spcPct val="20000"/>
+              </a:spcBef>
+              <a:buFont typeface="Arial"/>
+              <a:buChar char="•"/>
+              <a:defRPr sz="2000" kern="1200">
+                <a:solidFill>
+                  <a:schemeClr val="tx1"/>
+                </a:solidFill>
+                <a:latin typeface="+mn-lt"/>
+                <a:ea typeface="+mn-ea"/>
+                <a:cs typeface="+mn-cs"/>
+              </a:defRPr>
+            </a:lvl6pPr>
+            <a:lvl7pPr marL="2971800" indent="-228600" algn="l" defTabSz="457200" rtl="0" eaLnBrk="1" latinLnBrk="0" hangingPunct="1">
+              <a:spcBef>
+                <a:spcPct val="20000"/>
+              </a:spcBef>
+              <a:buFont typeface="Arial"/>
+              <a:buChar char="•"/>
+              <a:defRPr sz="2000" kern="1200">
+                <a:solidFill>
+                  <a:schemeClr val="tx1"/>
+                </a:solidFill>
+                <a:latin typeface="+mn-lt"/>
+                <a:ea typeface="+mn-ea"/>
+                <a:cs typeface="+mn-cs"/>
+              </a:defRPr>
+            </a:lvl7pPr>
+            <a:lvl8pPr marL="3429000" indent="-228600" algn="l" defTabSz="457200" rtl="0" eaLnBrk="1" latinLnBrk="0" hangingPunct="1">
+              <a:spcBef>
+                <a:spcPct val="20000"/>
+              </a:spcBef>
+              <a:buFont typeface="Arial"/>
+              <a:buChar char="•"/>
+              <a:defRPr sz="2000" kern="1200">
+                <a:solidFill>
+                  <a:schemeClr val="tx1"/>
+                </a:solidFill>
+                <a:latin typeface="+mn-lt"/>
+                <a:ea typeface="+mn-ea"/>
+                <a:cs typeface="+mn-cs"/>
+              </a:defRPr>
+            </a:lvl8pPr>
+            <a:lvl9pPr marL="3886200" indent="-228600" algn="l" defTabSz="457200" rtl="0" eaLnBrk="1" latinLnBrk="0" hangingPunct="1">
+              <a:spcBef>
+                <a:spcPct val="20000"/>
+              </a:spcBef>
+              <a:buFont typeface="Arial"/>
+              <a:buChar char="•"/>
+              <a:defRPr sz="2000" kern="1200">
+                <a:solidFill>
+                  <a:schemeClr val="tx1"/>
+                </a:solidFill>
+                <a:latin typeface="+mn-lt"/>
+                <a:ea typeface="+mn-ea"/>
+                <a:cs typeface="+mn-cs"/>
+              </a:defRPr>
+            </a:lvl9pPr>
+          </a:lstStyle>
+          <a:p>
+            <a:r>
+              <a:rPr lang="en-US" sz="2800" dirty="0" smtClean="0"/>
+              <a:t>Peppers bring the price up to 9.39; peppers at 40p. Price should be 9.49.</a:t>
+            </a:r>
+            <a:endParaRPr lang="en-US" sz="2800" dirty="0"/>
+          </a:p>
+        </p:txBody>
+      </p:sp>
+      <p:pic>
+        <p:nvPicPr>
+          <p:cNvPr id="9" name="Picture 8" descr="Screen Shot 2015-04-28 at 09.30.43.png"/>
+          <p:cNvPicPr>
+            <a:picLocks noChangeAspect="1"/>
+          </p:cNvPicPr>
+          <p:nvPr/>
+        </p:nvPicPr>
+        <p:blipFill>
+          <a:blip r:embed="rId3">
+            <a:extLst>
+              <a:ext uri="{28A0092B-C50C-407E-A947-70E740481C1C}">
+                <a14:useLocalDpi xmlns:a14="http://schemas.microsoft.com/office/drawing/2010/main" val="0"/>
+              </a:ext>
+            </a:extLst>
+          </a:blip>
+          <a:stretch>
+            <a:fillRect/>
+          </a:stretch>
+        </p:blipFill>
+        <p:spPr>
+          <a:xfrm>
+            <a:off x="-274158" y="2878668"/>
+            <a:ext cx="7135137" cy="3846285"/>
+          </a:xfrm>
+          <a:prstGeom prst="rect">
+            <a:avLst/>
+          </a:prstGeom>
+        </p:spPr>
+      </p:pic>
+      <p:sp>
+        <p:nvSpPr>
+          <p:cNvPr id="10" name="Content Placeholder 2"/>
+          <p:cNvSpPr txBox="1">
+            <a:spLocks/>
+          </p:cNvSpPr>
+          <p:nvPr/>
+        </p:nvSpPr>
+        <p:spPr>
+          <a:xfrm>
+            <a:off x="7124902" y="4178830"/>
+            <a:ext cx="4518781" cy="1718809"/>
+          </a:xfrm>
+          <a:prstGeom prst="rect">
+            <a:avLst/>
+          </a:prstGeom>
+        </p:spPr>
+        <p:txBody>
+          <a:bodyPr vert="horz" lIns="91440" tIns="45720" rIns="91440" bIns="45720" rtlCol="0">
+            <a:normAutofit/>
+          </a:bodyPr>
+          <a:lstStyle>
+            <a:lvl1pPr marL="342900" indent="-342900" algn="l" defTabSz="457200" rtl="0" eaLnBrk="1" latinLnBrk="0" hangingPunct="1">
+              <a:spcBef>
+                <a:spcPct val="20000"/>
+              </a:spcBef>
+              <a:buFont typeface="Arial"/>
+              <a:buChar char="•"/>
+              <a:defRPr sz="3200" kern="1200">
+                <a:solidFill>
+                  <a:schemeClr val="tx1"/>
+                </a:solidFill>
+                <a:latin typeface="+mn-lt"/>
+                <a:ea typeface="+mn-ea"/>
+                <a:cs typeface="+mn-cs"/>
+              </a:defRPr>
+            </a:lvl1pPr>
+            <a:lvl2pPr marL="742950" indent="-285750" algn="l" defTabSz="457200" rtl="0" eaLnBrk="1" latinLnBrk="0" hangingPunct="1">
+              <a:spcBef>
+                <a:spcPct val="20000"/>
+              </a:spcBef>
+              <a:buFont typeface="Arial"/>
+              <a:buChar char="–"/>
+              <a:defRPr sz="2800" kern="1200">
+                <a:solidFill>
+                  <a:schemeClr val="tx1"/>
+                </a:solidFill>
+                <a:latin typeface="+mn-lt"/>
+                <a:ea typeface="+mn-ea"/>
+                <a:cs typeface="+mn-cs"/>
+              </a:defRPr>
+            </a:lvl2pPr>
+            <a:lvl3pPr marL="1143000" indent="-228600" algn="l" defTabSz="457200" rtl="0" eaLnBrk="1" latinLnBrk="0" hangingPunct="1">
+              <a:spcBef>
+                <a:spcPct val="20000"/>
+              </a:spcBef>
+              <a:buFont typeface="Arial"/>
+              <a:buChar char="•"/>
+              <a:defRPr sz="2400" kern="1200">
+                <a:solidFill>
+                  <a:schemeClr val="tx1"/>
+                </a:solidFill>
+                <a:latin typeface="+mn-lt"/>
+                <a:ea typeface="+mn-ea"/>
+                <a:cs typeface="+mn-cs"/>
+              </a:defRPr>
+            </a:lvl3pPr>
+            <a:lvl4pPr marL="1600200" indent="-228600" algn="l" defTabSz="457200" rtl="0" eaLnBrk="1" latinLnBrk="0" hangingPunct="1">
+              <a:spcBef>
+                <a:spcPct val="20000"/>
+              </a:spcBef>
+              <a:buFont typeface="Arial"/>
+              <a:buChar char="–"/>
+              <a:defRPr sz="2000" kern="1200">
+                <a:solidFill>
+                  <a:schemeClr val="tx1"/>
+                </a:solidFill>
+                <a:latin typeface="+mn-lt"/>
+                <a:ea typeface="+mn-ea"/>
+                <a:cs typeface="+mn-cs"/>
+              </a:defRPr>
+            </a:lvl4pPr>
+            <a:lvl5pPr marL="2057400" indent="-228600" algn="l" defTabSz="457200" rtl="0" eaLnBrk="1" latinLnBrk="0" hangingPunct="1">
+              <a:spcBef>
+                <a:spcPct val="20000"/>
+              </a:spcBef>
+              <a:buFont typeface="Arial"/>
+              <a:buChar char="»"/>
+              <a:defRPr sz="2000" kern="1200">
+                <a:solidFill>
+                  <a:schemeClr val="tx1"/>
+                </a:solidFill>
+                <a:latin typeface="+mn-lt"/>
+                <a:ea typeface="+mn-ea"/>
+                <a:cs typeface="+mn-cs"/>
+              </a:defRPr>
+            </a:lvl5pPr>
+            <a:lvl6pPr marL="2514600" indent="-228600" algn="l" defTabSz="457200" rtl="0" eaLnBrk="1" latinLnBrk="0" hangingPunct="1">
+              <a:spcBef>
+                <a:spcPct val="20000"/>
+              </a:spcBef>
+              <a:buFont typeface="Arial"/>
+              <a:buChar char="•"/>
+              <a:defRPr sz="2000" kern="1200">
+                <a:solidFill>
+                  <a:schemeClr val="tx1"/>
+                </a:solidFill>
+                <a:latin typeface="+mn-lt"/>
+                <a:ea typeface="+mn-ea"/>
+                <a:cs typeface="+mn-cs"/>
+              </a:defRPr>
+            </a:lvl6pPr>
+            <a:lvl7pPr marL="2971800" indent="-228600" algn="l" defTabSz="457200" rtl="0" eaLnBrk="1" latinLnBrk="0" hangingPunct="1">
+              <a:spcBef>
+                <a:spcPct val="20000"/>
+              </a:spcBef>
+              <a:buFont typeface="Arial"/>
+              <a:buChar char="•"/>
+              <a:defRPr sz="2000" kern="1200">
+                <a:solidFill>
+                  <a:schemeClr val="tx1"/>
+                </a:solidFill>
+                <a:latin typeface="+mn-lt"/>
+                <a:ea typeface="+mn-ea"/>
+                <a:cs typeface="+mn-cs"/>
+              </a:defRPr>
+            </a:lvl7pPr>
+            <a:lvl8pPr marL="3429000" indent="-228600" algn="l" defTabSz="457200" rtl="0" eaLnBrk="1" latinLnBrk="0" hangingPunct="1">
+              <a:spcBef>
+                <a:spcPct val="20000"/>
+              </a:spcBef>
+              <a:buFont typeface="Arial"/>
+              <a:buChar char="•"/>
+              <a:defRPr sz="2000" kern="1200">
+                <a:solidFill>
+                  <a:schemeClr val="tx1"/>
+                </a:solidFill>
+                <a:latin typeface="+mn-lt"/>
+                <a:ea typeface="+mn-ea"/>
+                <a:cs typeface="+mn-cs"/>
+              </a:defRPr>
+            </a:lvl8pPr>
+            <a:lvl9pPr marL="3886200" indent="-228600" algn="l" defTabSz="457200" rtl="0" eaLnBrk="1" latinLnBrk="0" hangingPunct="1">
+              <a:spcBef>
+                <a:spcPct val="20000"/>
+              </a:spcBef>
+              <a:buFont typeface="Arial"/>
+              <a:buChar char="•"/>
+              <a:defRPr sz="2000" kern="1200">
+                <a:solidFill>
+                  <a:schemeClr val="tx1"/>
+                </a:solidFill>
+                <a:latin typeface="+mn-lt"/>
+                <a:ea typeface="+mn-ea"/>
+                <a:cs typeface="+mn-cs"/>
+              </a:defRPr>
+            </a:lvl9pPr>
+          </a:lstStyle>
+          <a:p>
+            <a:r>
+              <a:rPr lang="en-US" sz="2800" dirty="0" smtClean="0"/>
+              <a:t>Onions don’t add to basket with Cheese </a:t>
+            </a:r>
+            <a:r>
+              <a:rPr lang="en-US" sz="2800" dirty="0"/>
+              <a:t>P</a:t>
+            </a:r>
+            <a:r>
+              <a:rPr lang="en-US" sz="2800" dirty="0" smtClean="0"/>
+              <a:t>izza.</a:t>
+            </a:r>
+            <a:endParaRPr lang="en-US" sz="2800" dirty="0"/>
+          </a:p>
+        </p:txBody>
+      </p:sp>
+    </p:spTree>
+    <p:extLst>
+      <p:ext uri="{BB962C8B-B14F-4D97-AF65-F5344CB8AC3E}">
+        <p14:creationId xmlns:p14="http://schemas.microsoft.com/office/powerpoint/2010/main" val="1306271999"/>
+      </p:ext>
+    </p:extLst>
+  </p:cSld>
+  <p:clrMapOvr>
+    <a:masterClrMapping/>
+  </p:clrMapOvr>
+</p:sld>
+</file>
+
+<file path=ppt/slides/slide6.xml><?xml version="1.0" encoding="utf-8"?>
+<p:sld xmlns:a="http://schemas.openxmlformats.org/drawingml/2006/main" xmlns:r="http://schemas.openxmlformats.org/officeDocument/2006/relationships" xmlns:p="http://schemas.openxmlformats.org/presentationml/2006/main">
+  <p:cSld>
+    <p:spTree>
+      <p:nvGrpSpPr>
+        <p:cNvPr id="1" name=""/>
+        <p:cNvGrpSpPr/>
+        <p:nvPr/>
+      </p:nvGrpSpPr>
+      <p:grpSpPr>
+        <a:xfrm>
+          <a:off x="0" y="0"/>
+          <a:ext cx="0" cy="0"/>
+          <a:chOff x="0" y="0"/>
+          <a:chExt cx="0" cy="0"/>
+        </a:xfrm>
+      </p:grpSpPr>
+      <p:pic>
+        <p:nvPicPr>
+          <p:cNvPr id="6" name="Content Placeholder 3" descr="3.png"/>
+          <p:cNvPicPr>
+            <a:picLocks noGrp="1" noChangeAspect="1"/>
+          </p:cNvPicPr>
+          <p:nvPr>
+            <p:ph idx="1"/>
+          </p:nvPr>
+        </p:nvPicPr>
+        <p:blipFill>
+          <a:blip r:embed="rId2">
+            <a:extLst>
+              <a:ext uri="{28A0092B-C50C-407E-A947-70E740481C1C}">
+                <a14:useLocalDpi xmlns:a14="http://schemas.microsoft.com/office/drawing/2010/main" val="0"/>
+              </a:ext>
+            </a:extLst>
+          </a:blip>
+          <a:srcRect l="-113613" r="-113613"/>
+          <a:stretch>
+            <a:fillRect/>
+          </a:stretch>
+        </p:blipFill>
+        <p:spPr>
+          <a:xfrm>
+            <a:off x="-5784750" y="0"/>
+            <a:ext cx="16626619" cy="6858000"/>
+          </a:xfrm>
+        </p:spPr>
+      </p:pic>
+      <p:pic>
+        <p:nvPicPr>
+          <p:cNvPr id="7" name="Picture 6"/>
+          <p:cNvPicPr>
+            <a:picLocks noChangeAspect="1"/>
+          </p:cNvPicPr>
+          <p:nvPr/>
+        </p:nvPicPr>
+        <p:blipFill>
+          <a:blip r:embed="rId3"/>
+          <a:stretch>
+            <a:fillRect/>
+          </a:stretch>
+        </p:blipFill>
+        <p:spPr>
+          <a:xfrm>
+            <a:off x="7166741" y="1171314"/>
+            <a:ext cx="4052435" cy="5139925"/>
+          </a:xfrm>
+          <a:prstGeom prst="rect">
+            <a:avLst/>
+          </a:prstGeom>
+        </p:spPr>
+      </p:pic>
+    </p:spTree>
+    <p:extLst>
+      <p:ext uri="{BB962C8B-B14F-4D97-AF65-F5344CB8AC3E}">
+        <p14:creationId xmlns:p14="http://schemas.microsoft.com/office/powerpoint/2010/main" val="1388533094"/>
+      </p:ext>
+    </p:extLst>
+  </p:cSld>
+  <p:clrMapOvr>
+    <a:masterClrMapping/>
+  </p:clrMapOvr>
+</p:sld>
+</file>
+
+<file path=ppt/slides/slide7.xml><?xml version="1.0" encoding="utf-8"?>
+<p:sld xmlns:a="http://schemas.openxmlformats.org/drawingml/2006/main" xmlns:r="http://schemas.openxmlformats.org/officeDocument/2006/relationships" xmlns:p="http://schemas.openxmlformats.org/presentationml/2006/main">
+  <p:cSld>
+    <p:spTree>
+      <p:nvGrpSpPr>
+        <p:cNvPr id="1" name=""/>
+        <p:cNvGrpSpPr/>
+        <p:nvPr/>
+      </p:nvGrpSpPr>
+      <p:grpSpPr>
+        <a:xfrm>
+          <a:off x="0" y="0"/>
+          <a:ext cx="0" cy="0"/>
+          <a:chOff x="0" y="0"/>
+          <a:chExt cx="0" cy="0"/>
+        </a:xfrm>
+      </p:grpSpPr>
+      <p:sp>
+        <p:nvSpPr>
           <p:cNvPr id="4" name="Title 3"/>
           <p:cNvSpPr>
             <a:spLocks noGrp="1"/>
@@ -5392,7 +6831,7 @@
 </p:sld>
 </file>
 
-<file path=ppt/slides/slide3.xml><?xml version="1.0" encoding="utf-8"?>
+<file path=ppt/slides/slide8.xml><?xml version="1.0" encoding="utf-8"?>
 <p:sld xmlns:a="http://schemas.openxmlformats.org/drawingml/2006/main" xmlns:r="http://schemas.openxmlformats.org/officeDocument/2006/relationships" xmlns:p="http://schemas.openxmlformats.org/presentationml/2006/main">
   <p:cSld>
     <p:spTree>
@@ -5651,7 +7090,7 @@
 </p:sld>
 </file>
 
-<file path=ppt/slides/slide4.xml><?xml version="1.0" encoding="utf-8"?>
+<file path=ppt/slides/slide9.xml><?xml version="1.0" encoding="utf-8"?>
 <p:sld xmlns:a="http://schemas.openxmlformats.org/drawingml/2006/main" xmlns:r="http://schemas.openxmlformats.org/officeDocument/2006/relationships" xmlns:p="http://schemas.openxmlformats.org/presentationml/2006/main">
   <p:cSld>
     <p:spTree>
@@ -5849,678 +7288,6 @@
     <p:extLst>
       <p:ext uri="{BB962C8B-B14F-4D97-AF65-F5344CB8AC3E}">
         <p14:creationId xmlns:p14="http://schemas.microsoft.com/office/powerpoint/2010/main" val="691243737"/>
-      </p:ext>
-    </p:extLst>
-  </p:cSld>
-  <p:clrMapOvr>
-    <a:masterClrMapping/>
-  </p:clrMapOvr>
-</p:sld>
-</file>
-
-<file path=ppt/slides/slide5.xml><?xml version="1.0" encoding="utf-8"?>
-<p:sld xmlns:a="http://schemas.openxmlformats.org/drawingml/2006/main" xmlns:r="http://schemas.openxmlformats.org/officeDocument/2006/relationships" xmlns:p="http://schemas.openxmlformats.org/presentationml/2006/main">
-  <p:cSld>
-    <p:spTree>
-      <p:nvGrpSpPr>
-        <p:cNvPr id="1" name=""/>
-        <p:cNvGrpSpPr/>
-        <p:nvPr/>
-      </p:nvGrpSpPr>
-      <p:grpSpPr>
-        <a:xfrm>
-          <a:off x="0" y="0"/>
-          <a:ext cx="0" cy="0"/>
-          <a:chOff x="0" y="0"/>
-          <a:chExt cx="0" cy="0"/>
-        </a:xfrm>
-      </p:grpSpPr>
-      <p:sp>
-        <p:nvSpPr>
-          <p:cNvPr id="2" name="Title 1"/>
-          <p:cNvSpPr>
-            <a:spLocks noGrp="1"/>
-          </p:cNvSpPr>
-          <p:nvPr>
-            <p:ph type="title"/>
-          </p:nvPr>
-        </p:nvSpPr>
-        <p:spPr/>
-        <p:txBody>
-          <a:bodyPr/>
-          <a:lstStyle/>
-          <a:p>
-            <a:r>
-              <a:rPr lang="en-GB" dirty="0" smtClean="0"/>
-              <a:t>About Page</a:t>
-            </a:r>
-            <a:endParaRPr lang="en-GB" dirty="0"/>
-          </a:p>
-        </p:txBody>
-      </p:sp>
-      <p:sp>
-        <p:nvSpPr>
-          <p:cNvPr id="3" name="Content Placeholder 2"/>
-          <p:cNvSpPr>
-            <a:spLocks noGrp="1"/>
-          </p:cNvSpPr>
-          <p:nvPr>
-            <p:ph idx="1"/>
-          </p:nvPr>
-        </p:nvSpPr>
-        <p:spPr>
-          <a:xfrm>
-            <a:off x="1981200" y="1600201"/>
-            <a:ext cx="8229600" cy="1828800"/>
-          </a:xfrm>
-        </p:spPr>
-        <p:txBody>
-          <a:bodyPr/>
-          <a:lstStyle/>
-          <a:p>
-            <a:r>
-              <a:rPr lang="en-GB" dirty="0" smtClean="0"/>
-              <a:t>No user input sections</a:t>
-            </a:r>
-          </a:p>
-          <a:p>
-            <a:r>
-              <a:rPr lang="en-GB" dirty="0" smtClean="0"/>
-              <a:t>Mostly textual information</a:t>
-            </a:r>
-          </a:p>
-          <a:p>
-            <a:r>
-              <a:rPr lang="en-GB" dirty="0" smtClean="0"/>
-              <a:t>Only 2 cosmetic defects encountered</a:t>
-            </a:r>
-            <a:endParaRPr lang="en-GB" dirty="0"/>
-          </a:p>
-        </p:txBody>
-      </p:sp>
-      <p:graphicFrame>
-        <p:nvGraphicFramePr>
-          <p:cNvPr id="4" name="Chart 3"/>
-          <p:cNvGraphicFramePr>
-            <a:graphicFrameLocks/>
-          </p:cNvGraphicFramePr>
-          <p:nvPr>
-            <p:extLst/>
-          </p:nvPr>
-        </p:nvGraphicFramePr>
-        <p:xfrm>
-          <a:off x="1991544" y="3573017"/>
-          <a:ext cx="4572000" cy="2802467"/>
-        </p:xfrm>
-        <a:graphic>
-          <a:graphicData uri="http://schemas.openxmlformats.org/drawingml/2006/chart">
-            <c:chart xmlns:c="http://schemas.openxmlformats.org/drawingml/2006/chart" xmlns:r="http://schemas.openxmlformats.org/officeDocument/2006/relationships" r:id="rId2"/>
-          </a:graphicData>
-        </a:graphic>
-      </p:graphicFrame>
-      <p:pic>
-        <p:nvPicPr>
-          <p:cNvPr id="5" name="Picture 4"/>
-          <p:cNvPicPr/>
-          <p:nvPr/>
-        </p:nvPicPr>
-        <p:blipFill>
-          <a:blip r:embed="rId3">
-            <a:extLst>
-              <a:ext uri="{28A0092B-C50C-407E-A947-70E740481C1C}">
-                <a14:useLocalDpi xmlns:a14="http://schemas.microsoft.com/office/drawing/2010/main" val="0"/>
-              </a:ext>
-            </a:extLst>
-          </a:blip>
-          <a:stretch>
-            <a:fillRect/>
-          </a:stretch>
-        </p:blipFill>
-        <p:spPr>
-          <a:xfrm>
-            <a:off x="7104112" y="4077072"/>
-            <a:ext cx="2659380" cy="1057910"/>
-          </a:xfrm>
-          <a:prstGeom prst="rect">
-            <a:avLst/>
-          </a:prstGeom>
-        </p:spPr>
-      </p:pic>
-    </p:spTree>
-    <p:extLst>
-      <p:ext uri="{BB962C8B-B14F-4D97-AF65-F5344CB8AC3E}">
-        <p14:creationId xmlns:p14="http://schemas.microsoft.com/office/powerpoint/2010/main" val="1335319840"/>
-      </p:ext>
-    </p:extLst>
-  </p:cSld>
-  <p:clrMapOvr>
-    <a:masterClrMapping/>
-  </p:clrMapOvr>
-</p:sld>
-</file>
-
-<file path=ppt/slides/slide6.xml><?xml version="1.0" encoding="utf-8"?>
-<p:sld xmlns:a="http://schemas.openxmlformats.org/drawingml/2006/main" xmlns:r="http://schemas.openxmlformats.org/officeDocument/2006/relationships" xmlns:p="http://schemas.openxmlformats.org/presentationml/2006/main">
-  <p:cSld>
-    <p:spTree>
-      <p:nvGrpSpPr>
-        <p:cNvPr id="1" name=""/>
-        <p:cNvGrpSpPr/>
-        <p:nvPr/>
-      </p:nvGrpSpPr>
-      <p:grpSpPr>
-        <a:xfrm>
-          <a:off x="0" y="0"/>
-          <a:ext cx="0" cy="0"/>
-          <a:chOff x="0" y="0"/>
-          <a:chExt cx="0" cy="0"/>
-        </a:xfrm>
-      </p:grpSpPr>
-      <p:sp>
-        <p:nvSpPr>
-          <p:cNvPr id="2" name="Title 1"/>
-          <p:cNvSpPr>
-            <a:spLocks noGrp="1"/>
-          </p:cNvSpPr>
-          <p:nvPr>
-            <p:ph type="title"/>
-          </p:nvPr>
-        </p:nvSpPr>
-        <p:spPr/>
-        <p:txBody>
-          <a:bodyPr/>
-          <a:lstStyle/>
-          <a:p>
-            <a:r>
-              <a:rPr lang="en-GB" dirty="0" smtClean="0"/>
-              <a:t>Contact</a:t>
-            </a:r>
-            <a:endParaRPr lang="en-GB" dirty="0"/>
-          </a:p>
-        </p:txBody>
-      </p:sp>
-      <p:sp>
-        <p:nvSpPr>
-          <p:cNvPr id="3" name="Content Placeholder 2"/>
-          <p:cNvSpPr>
-            <a:spLocks noGrp="1"/>
-          </p:cNvSpPr>
-          <p:nvPr>
-            <p:ph idx="1"/>
-          </p:nvPr>
-        </p:nvSpPr>
-        <p:spPr/>
-        <p:txBody>
-          <a:bodyPr/>
-          <a:lstStyle/>
-          <a:p>
-            <a:endParaRPr lang="en-GB"/>
-          </a:p>
-        </p:txBody>
-      </p:sp>
-    </p:spTree>
-    <p:extLst>
-      <p:ext uri="{BB962C8B-B14F-4D97-AF65-F5344CB8AC3E}">
-        <p14:creationId xmlns:p14="http://schemas.microsoft.com/office/powerpoint/2010/main" val="1488213605"/>
-      </p:ext>
-    </p:extLst>
-  </p:cSld>
-  <p:clrMapOvr>
-    <a:masterClrMapping/>
-  </p:clrMapOvr>
-</p:sld>
-</file>
-
-<file path=ppt/slides/slide7.xml><?xml version="1.0" encoding="utf-8"?>
-<p:sld xmlns:a="http://schemas.openxmlformats.org/drawingml/2006/main" xmlns:r="http://schemas.openxmlformats.org/officeDocument/2006/relationships" xmlns:p="http://schemas.openxmlformats.org/presentationml/2006/main">
-  <p:cSld>
-    <p:spTree>
-      <p:nvGrpSpPr>
-        <p:cNvPr id="1" name=""/>
-        <p:cNvGrpSpPr/>
-        <p:nvPr/>
-      </p:nvGrpSpPr>
-      <p:grpSpPr>
-        <a:xfrm>
-          <a:off x="0" y="0"/>
-          <a:ext cx="0" cy="0"/>
-          <a:chOff x="0" y="0"/>
-          <a:chExt cx="0" cy="0"/>
-        </a:xfrm>
-      </p:grpSpPr>
-      <p:sp>
-        <p:nvSpPr>
-          <p:cNvPr id="2" name="Title 1"/>
-          <p:cNvSpPr>
-            <a:spLocks noGrp="1"/>
-          </p:cNvSpPr>
-          <p:nvPr>
-            <p:ph type="title"/>
-          </p:nvPr>
-        </p:nvSpPr>
-        <p:spPr/>
-        <p:txBody>
-          <a:bodyPr/>
-          <a:lstStyle/>
-          <a:p>
-            <a:r>
-              <a:rPr lang="en-GB" dirty="0" smtClean="0"/>
-              <a:t>Order Pizza</a:t>
-            </a:r>
-            <a:endParaRPr lang="en-GB" dirty="0"/>
-          </a:p>
-        </p:txBody>
-      </p:sp>
-      <p:sp>
-        <p:nvSpPr>
-          <p:cNvPr id="3" name="Content Placeholder 2"/>
-          <p:cNvSpPr>
-            <a:spLocks noGrp="1"/>
-          </p:cNvSpPr>
-          <p:nvPr>
-            <p:ph idx="1"/>
-          </p:nvPr>
-        </p:nvSpPr>
-        <p:spPr/>
-        <p:txBody>
-          <a:bodyPr/>
-          <a:lstStyle/>
-          <a:p>
-            <a:endParaRPr lang="en-GB"/>
-          </a:p>
-        </p:txBody>
-      </p:sp>
-    </p:spTree>
-    <p:extLst>
-      <p:ext uri="{BB962C8B-B14F-4D97-AF65-F5344CB8AC3E}">
-        <p14:creationId xmlns:p14="http://schemas.microsoft.com/office/powerpoint/2010/main" val="736551483"/>
-      </p:ext>
-    </p:extLst>
-  </p:cSld>
-  <p:clrMapOvr>
-    <a:masterClrMapping/>
-  </p:clrMapOvr>
-</p:sld>
-</file>
-
-<file path=ppt/slides/slide8.xml><?xml version="1.0" encoding="utf-8"?>
-<p:sld xmlns:a="http://schemas.openxmlformats.org/drawingml/2006/main" xmlns:r="http://schemas.openxmlformats.org/officeDocument/2006/relationships" xmlns:p="http://schemas.openxmlformats.org/presentationml/2006/main">
-  <p:cSld>
-    <p:spTree>
-      <p:nvGrpSpPr>
-        <p:cNvPr id="1" name=""/>
-        <p:cNvGrpSpPr/>
-        <p:nvPr/>
-      </p:nvGrpSpPr>
-      <p:grpSpPr>
-        <a:xfrm>
-          <a:off x="0" y="0"/>
-          <a:ext cx="0" cy="0"/>
-          <a:chOff x="0" y="0"/>
-          <a:chExt cx="0" cy="0"/>
-        </a:xfrm>
-      </p:grpSpPr>
-      <p:sp>
-        <p:nvSpPr>
-          <p:cNvPr id="2" name="Title 1"/>
-          <p:cNvSpPr>
-            <a:spLocks noGrp="1"/>
-          </p:cNvSpPr>
-          <p:nvPr>
-            <p:ph type="title"/>
-          </p:nvPr>
-        </p:nvSpPr>
-        <p:spPr/>
-        <p:txBody>
-          <a:bodyPr/>
-          <a:lstStyle/>
-          <a:p>
-            <a:r>
-              <a:rPr lang="en-GB" dirty="0" smtClean="0"/>
-              <a:t>Forgot Password Page</a:t>
-            </a:r>
-            <a:endParaRPr lang="en-GB" dirty="0"/>
-          </a:p>
-        </p:txBody>
-      </p:sp>
-      <p:sp>
-        <p:nvSpPr>
-          <p:cNvPr id="3" name="Content Placeholder 2"/>
-          <p:cNvSpPr>
-            <a:spLocks noGrp="1"/>
-          </p:cNvSpPr>
-          <p:nvPr>
-            <p:ph idx="1"/>
-          </p:nvPr>
-        </p:nvSpPr>
-        <p:spPr>
-          <a:xfrm>
-            <a:off x="1981200" y="1600202"/>
-            <a:ext cx="4762872" cy="2116831"/>
-          </a:xfrm>
-        </p:spPr>
-        <p:txBody>
-          <a:bodyPr>
-            <a:normAutofit fontScale="92500" lnSpcReduction="10000"/>
-          </a:bodyPr>
-          <a:lstStyle/>
-          <a:p>
-            <a:r>
-              <a:rPr lang="en-GB" dirty="0" smtClean="0"/>
-              <a:t>One minor defect</a:t>
-            </a:r>
-          </a:p>
-          <a:p>
-            <a:r>
-              <a:rPr lang="en-GB" dirty="0"/>
-              <a:t>E</a:t>
-            </a:r>
-            <a:r>
-              <a:rPr lang="en-GB" dirty="0" smtClean="0"/>
-              <a:t>mail subject reads “Bike IT – account details”</a:t>
-            </a:r>
-          </a:p>
-          <a:p>
-            <a:r>
-              <a:rPr lang="en-GB" dirty="0" smtClean="0"/>
-              <a:t>Appears unprofessional</a:t>
-            </a:r>
-          </a:p>
-          <a:p>
-            <a:r>
-              <a:rPr lang="en-GB" dirty="0" smtClean="0"/>
-              <a:t>Three cosmetic defects</a:t>
-            </a:r>
-          </a:p>
-        </p:txBody>
-      </p:sp>
-      <p:pic>
-        <p:nvPicPr>
-          <p:cNvPr id="5" name="Picture 4"/>
-          <p:cNvPicPr/>
-          <p:nvPr/>
-        </p:nvPicPr>
-        <p:blipFill>
-          <a:blip r:embed="rId3">
-            <a:extLst>
-              <a:ext uri="{28A0092B-C50C-407E-A947-70E740481C1C}">
-                <a14:useLocalDpi xmlns:a14="http://schemas.microsoft.com/office/drawing/2010/main" val="0"/>
-              </a:ext>
-            </a:extLst>
-          </a:blip>
-          <a:stretch>
-            <a:fillRect/>
-          </a:stretch>
-        </p:blipFill>
-        <p:spPr>
-          <a:xfrm>
-            <a:off x="7104112" y="4077072"/>
-            <a:ext cx="2659380" cy="1057910"/>
-          </a:xfrm>
-          <a:prstGeom prst="rect">
-            <a:avLst/>
-          </a:prstGeom>
-        </p:spPr>
-      </p:pic>
-      <p:graphicFrame>
-        <p:nvGraphicFramePr>
-          <p:cNvPr id="6" name="Chart 5"/>
-          <p:cNvGraphicFramePr>
-            <a:graphicFrameLocks/>
-          </p:cNvGraphicFramePr>
-          <p:nvPr>
-            <p:extLst/>
-          </p:nvPr>
-        </p:nvGraphicFramePr>
-        <p:xfrm>
-          <a:off x="2135560" y="3733749"/>
-          <a:ext cx="4572000" cy="2802467"/>
-        </p:xfrm>
-        <a:graphic>
-          <a:graphicData uri="http://schemas.openxmlformats.org/drawingml/2006/chart">
-            <c:chart xmlns:c="http://schemas.openxmlformats.org/drawingml/2006/chart" xmlns:r="http://schemas.openxmlformats.org/officeDocument/2006/relationships" r:id="rId4"/>
-          </a:graphicData>
-        </a:graphic>
-      </p:graphicFrame>
-      <p:pic>
-        <p:nvPicPr>
-          <p:cNvPr id="7" name="Picture 6"/>
-          <p:cNvPicPr>
-            <a:picLocks noChangeAspect="1"/>
-          </p:cNvPicPr>
-          <p:nvPr/>
-        </p:nvPicPr>
-        <p:blipFill rotWithShape="1">
-          <a:blip r:embed="rId5"/>
-          <a:srcRect l="40401" t="14765" r="38568" b="55704"/>
-          <a:stretch/>
-        </p:blipFill>
-        <p:spPr>
-          <a:xfrm>
-            <a:off x="7104113" y="1600201"/>
-            <a:ext cx="2863741" cy="2260847"/>
-          </a:xfrm>
-          <a:prstGeom prst="rect">
-            <a:avLst/>
-          </a:prstGeom>
-        </p:spPr>
-      </p:pic>
-    </p:spTree>
-    <p:extLst>
-      <p:ext uri="{BB962C8B-B14F-4D97-AF65-F5344CB8AC3E}">
-        <p14:creationId xmlns:p14="http://schemas.microsoft.com/office/powerpoint/2010/main" val="13974448"/>
-      </p:ext>
-    </p:extLst>
-  </p:cSld>
-  <p:clrMapOvr>
-    <a:masterClrMapping/>
-  </p:clrMapOvr>
-</p:sld>
-</file>
-
-<file path=ppt/slides/slide9.xml><?xml version="1.0" encoding="utf-8"?>
-<p:sld xmlns:a="http://schemas.openxmlformats.org/drawingml/2006/main" xmlns:r="http://schemas.openxmlformats.org/officeDocument/2006/relationships" xmlns:p="http://schemas.openxmlformats.org/presentationml/2006/main">
-  <p:cSld>
-    <p:spTree>
-      <p:nvGrpSpPr>
-        <p:cNvPr id="1" name=""/>
-        <p:cNvGrpSpPr/>
-        <p:nvPr/>
-      </p:nvGrpSpPr>
-      <p:grpSpPr>
-        <a:xfrm>
-          <a:off x="0" y="0"/>
-          <a:ext cx="0" cy="0"/>
-          <a:chOff x="0" y="0"/>
-          <a:chExt cx="0" cy="0"/>
-        </a:xfrm>
-      </p:grpSpPr>
-      <p:sp>
-        <p:nvSpPr>
-          <p:cNvPr id="2" name="Title 1"/>
-          <p:cNvSpPr>
-            <a:spLocks noGrp="1"/>
-          </p:cNvSpPr>
-          <p:nvPr>
-            <p:ph type="title"/>
-          </p:nvPr>
-        </p:nvSpPr>
-        <p:spPr>
-          <a:xfrm>
-            <a:off x="1991544" y="188640"/>
-            <a:ext cx="8229600" cy="1143000"/>
-          </a:xfrm>
-        </p:spPr>
-        <p:txBody>
-          <a:bodyPr/>
-          <a:lstStyle/>
-          <a:p>
-            <a:r>
-              <a:rPr lang="en-GB" dirty="0" smtClean="0"/>
-              <a:t>Schedule Order Page</a:t>
-            </a:r>
-            <a:endParaRPr lang="en-GB" dirty="0"/>
-          </a:p>
-        </p:txBody>
-      </p:sp>
-      <p:sp>
-        <p:nvSpPr>
-          <p:cNvPr id="3" name="Content Placeholder 2"/>
-          <p:cNvSpPr>
-            <a:spLocks noGrp="1"/>
-          </p:cNvSpPr>
-          <p:nvPr>
-            <p:ph idx="1"/>
-          </p:nvPr>
-        </p:nvSpPr>
-        <p:spPr>
-          <a:xfrm>
-            <a:off x="1847528" y="1478851"/>
-            <a:ext cx="8136904" cy="4536504"/>
-          </a:xfrm>
-        </p:spPr>
-        <p:txBody>
-          <a:bodyPr>
-            <a:noAutofit/>
-          </a:bodyPr>
-          <a:lstStyle/>
-          <a:p>
-            <a:r>
-              <a:rPr lang="en-GB" sz="2200" dirty="0"/>
-              <a:t>1 Moderate, 7 Major, 4 Critical defects</a:t>
-            </a:r>
-          </a:p>
-          <a:p>
-            <a:r>
-              <a:rPr lang="en-GB" sz="2200" dirty="0"/>
-              <a:t>Critical defects were caused by the order validation button still working after trying to order beyond the limit of one week in the ‘Later Service’</a:t>
-            </a:r>
-          </a:p>
-          <a:p>
-            <a:r>
-              <a:rPr lang="en-GB" sz="2200" dirty="0"/>
-              <a:t>Automated Selenium Tests caused Major defects in testing as </a:t>
-            </a:r>
-          </a:p>
-          <a:p>
-            <a:pPr marL="0" indent="0">
-              <a:buNone/>
-            </a:pPr>
-            <a:r>
-              <a:rPr lang="en-GB" sz="2200" dirty="0"/>
-              <a:t>      the pop up boxes would cause ‘time </a:t>
-            </a:r>
-          </a:p>
-          <a:p>
-            <a:pPr marL="0" indent="0">
-              <a:buNone/>
-            </a:pPr>
-            <a:r>
-              <a:rPr lang="en-GB" sz="2200" dirty="0"/>
-              <a:t>      outs’ before moving onto the next page</a:t>
-            </a:r>
-          </a:p>
-          <a:p>
-            <a:r>
-              <a:rPr lang="en-GB" sz="2200" dirty="0"/>
-              <a:t>Moderate and Exploratory issues such as </a:t>
-            </a:r>
-          </a:p>
-          <a:p>
-            <a:pPr marL="0" indent="0">
-              <a:buNone/>
-            </a:pPr>
-            <a:r>
-              <a:rPr lang="en-GB" sz="2200" dirty="0"/>
-              <a:t>      the ‘Now Service’ showing collection time </a:t>
-            </a:r>
-          </a:p>
-          <a:p>
-            <a:pPr marL="0" indent="0">
-              <a:buNone/>
-            </a:pPr>
-            <a:r>
-              <a:rPr lang="en-GB" sz="2200" dirty="0"/>
-              <a:t>      is 10 </a:t>
-            </a:r>
-            <a:r>
-              <a:rPr lang="en-GB" sz="2200" dirty="0" err="1"/>
-              <a:t>mins</a:t>
-            </a:r>
-            <a:r>
-              <a:rPr lang="en-GB" sz="2200" dirty="0"/>
-              <a:t> over what is expected </a:t>
-            </a:r>
-          </a:p>
-          <a:p>
-            <a:pPr marL="0" indent="0">
-              <a:buNone/>
-            </a:pPr>
-            <a:r>
-              <a:rPr lang="en-GB" sz="2200" dirty="0"/>
-              <a:t>      </a:t>
-            </a:r>
-          </a:p>
-          <a:p>
-            <a:pPr marL="0" indent="0">
-              <a:buNone/>
-            </a:pPr>
-            <a:endParaRPr lang="en-GB" sz="2200" dirty="0"/>
-          </a:p>
-        </p:txBody>
-      </p:sp>
-      <p:pic>
-        <p:nvPicPr>
-          <p:cNvPr id="5" name="Picture 4"/>
-          <p:cNvPicPr/>
-          <p:nvPr/>
-        </p:nvPicPr>
-        <p:blipFill>
-          <a:blip r:embed="rId3">
-            <a:extLst>
-              <a:ext uri="{28A0092B-C50C-407E-A947-70E740481C1C}">
-                <a14:useLocalDpi xmlns:a14="http://schemas.microsoft.com/office/drawing/2010/main" val="0"/>
-              </a:ext>
-            </a:extLst>
-          </a:blip>
-          <a:stretch>
-            <a:fillRect/>
-          </a:stretch>
-        </p:blipFill>
-        <p:spPr>
-          <a:xfrm>
-            <a:off x="3143672" y="5517232"/>
-            <a:ext cx="2659380" cy="1057910"/>
-          </a:xfrm>
-          <a:prstGeom prst="rect">
-            <a:avLst/>
-          </a:prstGeom>
-        </p:spPr>
-      </p:pic>
-      <p:graphicFrame>
-        <p:nvGraphicFramePr>
-          <p:cNvPr id="9" name="Chart 8"/>
-          <p:cNvGraphicFramePr>
-            <a:graphicFrameLocks/>
-          </p:cNvGraphicFramePr>
-          <p:nvPr>
-            <p:extLst/>
-          </p:nvPr>
-        </p:nvGraphicFramePr>
-        <p:xfrm>
-          <a:off x="7464152" y="3645025"/>
-          <a:ext cx="2941390" cy="2870161"/>
-        </p:xfrm>
-        <a:graphic>
-          <a:graphicData uri="http://schemas.openxmlformats.org/drawingml/2006/chart">
-            <c:chart xmlns:c="http://schemas.openxmlformats.org/drawingml/2006/chart" xmlns:r="http://schemas.openxmlformats.org/officeDocument/2006/relationships" r:id="rId4"/>
-          </a:graphicData>
-        </a:graphic>
-      </p:graphicFrame>
-    </p:spTree>
-    <p:extLst>
-      <p:ext uri="{BB962C8B-B14F-4D97-AF65-F5344CB8AC3E}">
-        <p14:creationId xmlns:p14="http://schemas.microsoft.com/office/powerpoint/2010/main" val="3003426415"/>
       </p:ext>
     </p:extLst>
   </p:cSld>
@@ -6785,7 +7552,7 @@
   <a:extraClrSchemeLst/>
   <a:extLst>
     <a:ext uri="{05A4C25C-085E-4340-85A3-A5531E510DB2}">
-      <thm15:themeFamily xmlns:thm15="http://schemas.microsoft.com/office/thememl/2012/main" xmlns="" name="Office Theme" id="{62F939B6-93AF-4DB8-9C6B-D6C7DFDC589F}" vid="{4A3C46E8-61CC-4603-A589-7422A47A8E4A}"/>
+      <thm15:themeFamily xmlns="" xmlns:thm15="http://schemas.microsoft.com/office/thememl/2012/main" name="Office Theme" id="{62F939B6-93AF-4DB8-9C6B-D6C7DFDC589F}" vid="{4A3C46E8-61CC-4603-A589-7422A47A8E4A}"/>
     </a:ext>
   </a:extLst>
 </a:theme>
@@ -7046,7 +7813,7 @@
   <a:extraClrSchemeLst/>
   <a:extLst>
     <a:ext uri="{05A4C25C-085E-4340-85A3-A5531E510DB2}">
-      <thm15:themeFamily xmlns:thm15="http://schemas.microsoft.com/office/thememl/2012/main" xmlns="" name="Office Theme" id="{62F939B6-93AF-4DB8-9C6B-D6C7DFDC589F}" vid="{4A3C46E8-61CC-4603-A589-7422A47A8E4A}"/>
+      <thm15:themeFamily xmlns="" xmlns:thm15="http://schemas.microsoft.com/office/thememl/2012/main" name="Office Theme" id="{62F939B6-93AF-4DB8-9C6B-D6C7DFDC589F}" vid="{4A3C46E8-61CC-4603-A589-7422A47A8E4A}"/>
     </a:ext>
   </a:extLst>
 </a:theme>

</xml_diff>